<commit_message>
Updated User Manual and PowerPoint
</commit_message>
<xml_diff>
--- a/Documentation/Iteration3.pptx
+++ b/Documentation/Iteration3.pptx
@@ -5,23 +5,26 @@
     <p:sldMasterId id="2147483661" r:id="rId1"/>
   </p:sldMasterIdLst>
   <p:notesMasterIdLst>
-    <p:notesMasterId r:id="rId16"/>
+    <p:notesMasterId r:id="rId19"/>
   </p:notesMasterIdLst>
   <p:sldIdLst>
     <p:sldId id="256" r:id="rId2"/>
     <p:sldId id="260" r:id="rId3"/>
-    <p:sldId id="262" r:id="rId4"/>
-    <p:sldId id="273" r:id="rId5"/>
-    <p:sldId id="274" r:id="rId6"/>
-    <p:sldId id="275" r:id="rId7"/>
-    <p:sldId id="276" r:id="rId8"/>
-    <p:sldId id="277" r:id="rId9"/>
-    <p:sldId id="267" r:id="rId10"/>
-    <p:sldId id="268" r:id="rId11"/>
-    <p:sldId id="269" r:id="rId12"/>
-    <p:sldId id="271" r:id="rId13"/>
-    <p:sldId id="272" r:id="rId14"/>
-    <p:sldId id="270" r:id="rId15"/>
+    <p:sldId id="278" r:id="rId4"/>
+    <p:sldId id="279" r:id="rId5"/>
+    <p:sldId id="281" r:id="rId6"/>
+    <p:sldId id="283" r:id="rId7"/>
+    <p:sldId id="262" r:id="rId8"/>
+    <p:sldId id="282" r:id="rId9"/>
+    <p:sldId id="273" r:id="rId10"/>
+    <p:sldId id="274" r:id="rId11"/>
+    <p:sldId id="277" r:id="rId12"/>
+    <p:sldId id="267" r:id="rId13"/>
+    <p:sldId id="268" r:id="rId14"/>
+    <p:sldId id="269" r:id="rId15"/>
+    <p:sldId id="271" r:id="rId16"/>
+    <p:sldId id="272" r:id="rId17"/>
+    <p:sldId id="270" r:id="rId18"/>
   </p:sldIdLst>
   <p:sldSz cx="13004800" cy="9753600"/>
   <p:notesSz cx="6858000" cy="9144000"/>
@@ -1106,7 +1109,7 @@
             <a:fld id="{B61BEF0D-F0BB-DE4B-95CE-6DB70DBA9567}" type="datetimeFigureOut">
               <a:rPr lang="en-US" dirty="0"/>
               <a:pPr/>
-              <a:t>11/28/2018</a:t>
+              <a:t>11/29/2018</a:t>
             </a:fld>
             <a:endParaRPr lang="en-US" dirty="0"/>
           </a:p>
@@ -1358,7 +1361,7 @@
             <a:fld id="{B61BEF0D-F0BB-DE4B-95CE-6DB70DBA9567}" type="datetimeFigureOut">
               <a:rPr lang="en-US" dirty="0"/>
               <a:pPr/>
-              <a:t>11/28/2018</a:t>
+              <a:t>11/29/2018</a:t>
             </a:fld>
             <a:endParaRPr lang="en-US" dirty="0"/>
           </a:p>
@@ -1673,7 +1676,7 @@
             <a:fld id="{B61BEF0D-F0BB-DE4B-95CE-6DB70DBA9567}" type="datetimeFigureOut">
               <a:rPr lang="en-US" dirty="0"/>
               <a:pPr/>
-              <a:t>11/28/2018</a:t>
+              <a:t>11/29/2018</a:t>
             </a:fld>
             <a:endParaRPr lang="en-US" dirty="0"/>
           </a:p>
@@ -2007,7 +2010,7 @@
             <a:fld id="{B61BEF0D-F0BB-DE4B-95CE-6DB70DBA9567}" type="datetimeFigureOut">
               <a:rPr lang="en-US" dirty="0"/>
               <a:pPr/>
-              <a:t>11/28/2018</a:t>
+              <a:t>11/29/2018</a:t>
             </a:fld>
             <a:endParaRPr lang="en-US" dirty="0"/>
           </a:p>
@@ -2322,7 +2325,7 @@
             <a:fld id="{B61BEF0D-F0BB-DE4B-95CE-6DB70DBA9567}" type="datetimeFigureOut">
               <a:rPr lang="en-US" dirty="0"/>
               <a:pPr/>
-              <a:t>11/28/2018</a:t>
+              <a:t>11/29/2018</a:t>
             </a:fld>
             <a:endParaRPr lang="en-US" dirty="0"/>
           </a:p>
@@ -2716,7 +2719,7 @@
             <a:fld id="{B61BEF0D-F0BB-DE4B-95CE-6DB70DBA9567}" type="datetimeFigureOut">
               <a:rPr lang="en-US" dirty="0"/>
               <a:pPr/>
-              <a:t>11/28/2018</a:t>
+              <a:t>11/29/2018</a:t>
             </a:fld>
             <a:endParaRPr lang="en-US" dirty="0"/>
           </a:p>
@@ -2886,7 +2889,7 @@
           <a:p>
             <a:fld id="{70DDF080-5E8C-48AD-84E5-6C08B304C14E}" type="datetimeFigureOut">
               <a:rPr lang="en-US" dirty="0"/>
-              <a:t>11/28/2018</a:t>
+              <a:t>11/29/2018</a:t>
             </a:fld>
             <a:endParaRPr lang="en-US" dirty="0"/>
           </a:p>
@@ -3067,7 +3070,7 @@
             <a:fld id="{B61BEF0D-F0BB-DE4B-95CE-6DB70DBA9567}" type="datetimeFigureOut">
               <a:rPr lang="en-US" dirty="0"/>
               <a:pPr/>
-              <a:t>11/28/2018</a:t>
+              <a:t>11/29/2018</a:t>
             </a:fld>
             <a:endParaRPr lang="en-US" dirty="0"/>
           </a:p>
@@ -3384,7 +3387,7 @@
           <a:p>
             <a:fld id="{70DDF080-5E8C-48AD-84E5-6C08B304C14E}" type="datetimeFigureOut">
               <a:rPr lang="en-US" dirty="0"/>
-              <a:t>11/28/2018</a:t>
+              <a:t>11/29/2018</a:t>
             </a:fld>
             <a:endParaRPr lang="en-US" dirty="0"/>
           </a:p>
@@ -3632,7 +3635,7 @@
             <a:fld id="{B61BEF0D-F0BB-DE4B-95CE-6DB70DBA9567}" type="datetimeFigureOut">
               <a:rPr lang="en-US" dirty="0"/>
               <a:pPr/>
-              <a:t>11/28/2018</a:t>
+              <a:t>11/29/2018</a:t>
             </a:fld>
             <a:endParaRPr lang="en-US" dirty="0"/>
           </a:p>
@@ -3930,7 +3933,7 @@
             <a:fld id="{B61BEF0D-F0BB-DE4B-95CE-6DB70DBA9567}" type="datetimeFigureOut">
               <a:rPr lang="en-US" dirty="0"/>
               <a:pPr/>
-              <a:t>11/28/2018</a:t>
+              <a:t>11/29/2018</a:t>
             </a:fld>
             <a:endParaRPr lang="en-US" dirty="0"/>
           </a:p>
@@ -4310,7 +4313,7 @@
             <a:fld id="{B61BEF0D-F0BB-DE4B-95CE-6DB70DBA9567}" type="datetimeFigureOut">
               <a:rPr lang="en-US" dirty="0"/>
               <a:pPr/>
-              <a:t>11/28/2018</a:t>
+              <a:t>11/29/2018</a:t>
             </a:fld>
             <a:endParaRPr lang="en-US" dirty="0"/>
           </a:p>
@@ -4434,7 +4437,7 @@
             <a:fld id="{B61BEF0D-F0BB-DE4B-95CE-6DB70DBA9567}" type="datetimeFigureOut">
               <a:rPr lang="en-US" dirty="0"/>
               <a:pPr/>
-              <a:t>11/28/2018</a:t>
+              <a:t>11/29/2018</a:t>
             </a:fld>
             <a:endParaRPr lang="en-US" dirty="0"/>
           </a:p>
@@ -4530,7 +4533,7 @@
             <a:fld id="{B61BEF0D-F0BB-DE4B-95CE-6DB70DBA9567}" type="datetimeFigureOut">
               <a:rPr lang="en-US" dirty="0"/>
               <a:pPr/>
-              <a:t>11/28/2018</a:t>
+              <a:t>11/29/2018</a:t>
             </a:fld>
             <a:endParaRPr lang="en-US" dirty="0"/>
           </a:p>
@@ -4785,7 +4788,7 @@
           <a:p>
             <a:fld id="{70DDF080-5E8C-48AD-84E5-6C08B304C14E}" type="datetimeFigureOut">
               <a:rPr lang="en-US" dirty="0"/>
-              <a:t>11/28/2018</a:t>
+              <a:t>11/29/2018</a:t>
             </a:fld>
             <a:endParaRPr lang="en-US" dirty="0"/>
           </a:p>
@@ -5049,7 +5052,7 @@
             <a:fld id="{B61BEF0D-F0BB-DE4B-95CE-6DB70DBA9567}" type="datetimeFigureOut">
               <a:rPr lang="en-US" dirty="0"/>
               <a:pPr/>
-              <a:t>11/28/2018</a:t>
+              <a:t>11/29/2018</a:t>
             </a:fld>
             <a:endParaRPr lang="en-US" dirty="0"/>
           </a:p>
@@ -5864,7 +5867,7 @@
             <a:fld id="{B61BEF0D-F0BB-DE4B-95CE-6DB70DBA9567}" type="datetimeFigureOut">
               <a:rPr lang="en-US" dirty="0"/>
               <a:pPr/>
-              <a:t>11/28/2018</a:t>
+              <a:t>11/29/2018</a:t>
             </a:fld>
             <a:endParaRPr lang="en-US" dirty="0"/>
           </a:p>
@@ -6401,7 +6404,7 @@
         </p:nvSpPr>
         <p:spPr>
           <a:xfrm>
-            <a:off x="2831089" y="4724400"/>
+            <a:off x="2745479" y="4875833"/>
             <a:ext cx="6040769" cy="1324430"/>
           </a:xfrm>
           <a:prstGeom prst="rect">
@@ -6465,8 +6468,8 @@
         </p:nvSpPr>
         <p:spPr>
           <a:xfrm>
-            <a:off x="740078" y="7891854"/>
-            <a:ext cx="2447529" cy="1210588"/>
+            <a:off x="740078" y="7422589"/>
+            <a:ext cx="2986533" cy="1826141"/>
           </a:xfrm>
           <a:prstGeom prst="rect">
             <a:avLst/>
@@ -6476,12 +6479,12 @@
           </a:ln>
           <a:extLst>
             <a:ext uri="{C572A759-6A51-4108-AA02-DFA0A04FC94B}">
-              <ma14:wrappingTextBoxFlag xmlns="" xmlns:ma14="http://schemas.microsoft.com/office/mac/drawingml/2011/main" val="1"/>
+              <ma14:wrappingTextBoxFlag xmlns:ma14="http://schemas.microsoft.com/office/mac/drawingml/2011/main" xmlns="" val="1"/>
             </a:ext>
           </a:extLst>
         </p:spPr>
         <p:txBody>
-          <a:bodyPr wrap="none" lIns="50800" tIns="50800" rIns="50800" bIns="50800" anchor="ctr">
+          <a:bodyPr wrap="square" lIns="50800" tIns="50800" rIns="50800" bIns="50800" anchor="ctr">
             <a:spAutoFit/>
           </a:bodyPr>
           <a:lstStyle/>
@@ -6495,14 +6498,9 @@
               </a:defRPr>
             </a:pPr>
             <a:r>
-              <a:rPr sz="2400" dirty="0"/>
-              <a:t>Asher Snavely</a:t>
-            </a:r>
-            <a:r>
-              <a:rPr lang="en-US" sz="2400" dirty="0"/>
-              <a:t> </a:t>
-            </a:r>
-            <a:endParaRPr sz="2400" dirty="0"/>
+              <a:rPr lang="en-US" sz="2800" dirty="0"/>
+              <a:t>Team TBD 2 :</a:t>
+            </a:r>
           </a:p>
           <a:p>
             <a:pPr>
@@ -6514,18 +6512,14 @@
               </a:defRPr>
             </a:pPr>
             <a:r>
-              <a:rPr sz="2400" dirty="0" err="1"/>
-              <a:t>Xiangan</a:t>
-            </a:r>
-            <a:r>
-              <a:rPr sz="2400" dirty="0"/>
-              <a:t> Wan</a:t>
-            </a:r>
-            <a:r>
-              <a:rPr lang="en-US" sz="2400" dirty="0"/>
-              <a:t> (Roy)</a:t>
-            </a:r>
-            <a:endParaRPr sz="2400" dirty="0"/>
+              <a:rPr sz="2800" dirty="0"/>
+              <a:t>Asher Snavely</a:t>
+            </a:r>
+            <a:r>
+              <a:rPr lang="en-US" sz="2800" dirty="0"/>
+              <a:t> </a:t>
+            </a:r>
+            <a:endParaRPr sz="2800" dirty="0"/>
           </a:p>
           <a:p>
             <a:pPr>
@@ -6537,18 +6531,41 @@
               </a:defRPr>
             </a:pPr>
             <a:r>
-              <a:rPr sz="2400" dirty="0" err="1"/>
+              <a:rPr sz="2800" dirty="0" err="1"/>
+              <a:t>Xiangan</a:t>
+            </a:r>
+            <a:r>
+              <a:rPr sz="2800" dirty="0"/>
+              <a:t> Wan</a:t>
+            </a:r>
+            <a:r>
+              <a:rPr lang="en-US" sz="2800" dirty="0"/>
+              <a:t> (Roy)</a:t>
+            </a:r>
+            <a:endParaRPr sz="2800" dirty="0"/>
+          </a:p>
+          <a:p>
+            <a:pPr>
+              <a:defRPr b="0">
+                <a:latin typeface="Phosphate Inline"/>
+                <a:ea typeface="Phosphate Inline"/>
+                <a:cs typeface="Phosphate Inline"/>
+                <a:sym typeface="Phosphate Inline"/>
+              </a:defRPr>
+            </a:pPr>
+            <a:r>
+              <a:rPr sz="2800" dirty="0" err="1"/>
               <a:t>Yunzhe</a:t>
             </a:r>
             <a:r>
-              <a:rPr sz="2400" dirty="0"/>
+              <a:rPr sz="2800" dirty="0"/>
               <a:t> Liu</a:t>
             </a:r>
             <a:r>
-              <a:rPr lang="en-US" sz="2400" dirty="0"/>
+              <a:rPr lang="en-US" sz="2800" dirty="0"/>
               <a:t> (Josh)</a:t>
             </a:r>
-            <a:endParaRPr sz="2400" dirty="0"/>
+            <a:endParaRPr sz="2800" dirty="0"/>
           </a:p>
         </p:txBody>
       </p:sp>
@@ -6557,11 +6574,132 @@
   <p:clrMapOvr>
     <a:masterClrMapping/>
   </p:clrMapOvr>
+  <p:timing>
+    <p:tnLst>
+      <p:par>
+        <p:cTn id="1" dur="indefinite" restart="never" nodeType="tmRoot">
+          <p:childTnLst>
+            <p:seq concurrent="1" nextAc="seek">
+              <p:cTn id="2" dur="indefinite" nodeType="mainSeq">
+                <p:childTnLst>
+                  <p:par>
+                    <p:cTn id="3" fill="hold">
+                      <p:stCondLst>
+                        <p:cond delay="indefinite"/>
+                      </p:stCondLst>
+                      <p:childTnLst>
+                        <p:par>
+                          <p:cTn id="4" fill="hold">
+                            <p:stCondLst>
+                              <p:cond delay="0"/>
+                            </p:stCondLst>
+                            <p:childTnLst>
+                              <p:par>
+                                <p:cTn id="5" presetID="2" presetClass="entr" presetSubtype="8" fill="hold" nodeType="clickEffect">
+                                  <p:stCondLst>
+                                    <p:cond delay="0"/>
+                                  </p:stCondLst>
+                                  <p:childTnLst>
+                                    <p:set>
+                                      <p:cBhvr>
+                                        <p:cTn id="6" dur="1" fill="hold">
+                                          <p:stCondLst>
+                                            <p:cond delay="0"/>
+                                          </p:stCondLst>
+                                        </p:cTn>
+                                        <p:tgtEl>
+                                          <p:spTgt spid="120"/>
+                                        </p:tgtEl>
+                                        <p:attrNameLst>
+                                          <p:attrName>style.visibility</p:attrName>
+                                        </p:attrNameLst>
+                                      </p:cBhvr>
+                                      <p:to>
+                                        <p:strVal val="visible"/>
+                                      </p:to>
+                                    </p:set>
+                                    <p:anim calcmode="lin" valueType="num">
+                                      <p:cBhvr additive="base">
+                                        <p:cTn id="7" dur="500" fill="hold"/>
+                                        <p:tgtEl>
+                                          <p:spTgt spid="120"/>
+                                        </p:tgtEl>
+                                        <p:attrNameLst>
+                                          <p:attrName>ppt_x</p:attrName>
+                                        </p:attrNameLst>
+                                      </p:cBhvr>
+                                      <p:tavLst>
+                                        <p:tav tm="0">
+                                          <p:val>
+                                            <p:strVal val="0-#ppt_w/2"/>
+                                          </p:val>
+                                        </p:tav>
+                                        <p:tav tm="100000">
+                                          <p:val>
+                                            <p:strVal val="#ppt_x"/>
+                                          </p:val>
+                                        </p:tav>
+                                      </p:tavLst>
+                                    </p:anim>
+                                    <p:anim calcmode="lin" valueType="num">
+                                      <p:cBhvr additive="base">
+                                        <p:cTn id="8" dur="500" fill="hold"/>
+                                        <p:tgtEl>
+                                          <p:spTgt spid="120"/>
+                                        </p:tgtEl>
+                                        <p:attrNameLst>
+                                          <p:attrName>ppt_y</p:attrName>
+                                        </p:attrNameLst>
+                                      </p:cBhvr>
+                                      <p:tavLst>
+                                        <p:tav tm="0">
+                                          <p:val>
+                                            <p:strVal val="#ppt_y"/>
+                                          </p:val>
+                                        </p:tav>
+                                        <p:tav tm="100000">
+                                          <p:val>
+                                            <p:strVal val="#ppt_y"/>
+                                          </p:val>
+                                        </p:tav>
+                                      </p:tavLst>
+                                    </p:anim>
+                                  </p:childTnLst>
+                                </p:cTn>
+                              </p:par>
+                            </p:childTnLst>
+                          </p:cTn>
+                        </p:par>
+                      </p:childTnLst>
+                    </p:cTn>
+                  </p:par>
+                </p:childTnLst>
+              </p:cTn>
+              <p:prevCondLst>
+                <p:cond evt="onPrev" delay="0">
+                  <p:tgtEl>
+                    <p:sldTgt/>
+                  </p:tgtEl>
+                </p:cond>
+              </p:prevCondLst>
+              <p:nextCondLst>
+                <p:cond evt="onNext" delay="0">
+                  <p:tgtEl>
+                    <p:sldTgt/>
+                  </p:tgtEl>
+                </p:cond>
+              </p:nextCondLst>
+            </p:seq>
+          </p:childTnLst>
+        </p:cTn>
+      </p:par>
+    </p:tnLst>
+  </p:timing>
 </p:sld>
 </file>
 
 <file path=ppt/slides/slide10.xml><?xml version="1.0" encoding="utf-8"?>
-<p:sld xmlns:a="http://schemas.openxmlformats.org/drawingml/2006/main" xmlns:r="http://schemas.openxmlformats.org/officeDocument/2006/relationships" xmlns:p="http://schemas.openxmlformats.org/presentationml/2006/main" show="0">
+<p:sld xmlns:a="http://schemas.openxmlformats.org/drawingml/2006/main" xmlns:r="http://schemas.openxmlformats.org/officeDocument/2006/relationships" xmlns:p="http://schemas.openxmlformats.org/presentationml/2006/main">
   <p:cSld>
     <p:spTree>
       <p:nvGrpSpPr>
@@ -6577,48 +6715,12 @@
           <a:chExt cx="0" cy="0"/>
         </a:xfrm>
       </p:grpSpPr>
-      <p:sp>
-        <p:nvSpPr>
-          <p:cNvPr id="152" name="Title"/>
-          <p:cNvSpPr txBox="1">
-            <a:spLocks noGrp="1"/>
-          </p:cNvSpPr>
-          <p:nvPr>
-            <p:ph type="title"/>
-          </p:nvPr>
-        </p:nvSpPr>
-        <p:spPr>
-          <a:xfrm>
-            <a:off x="866985" y="866988"/>
-            <a:ext cx="9027858" cy="929156"/>
-          </a:xfrm>
-          <a:prstGeom prst="rect">
-            <a:avLst/>
-          </a:prstGeom>
-        </p:spPr>
-        <p:txBody>
-          <a:bodyPr>
-            <a:normAutofit fontScale="90000"/>
-          </a:bodyPr>
-          <a:lstStyle/>
-          <a:p>
-            <a:r>
-              <a:rPr lang="en-US" dirty="0"/>
-              <a:t>Register Page Demo</a:t>
-            </a:r>
-            <a:br>
-              <a:rPr lang="en-US" dirty="0"/>
-            </a:br>
-            <a:endParaRPr dirty="0"/>
-          </a:p>
-        </p:txBody>
-      </p:sp>
       <p:pic>
         <p:nvPicPr>
-          <p:cNvPr id="5" name="Picture 4" descr="Design Preview [RegisterGUI]">
+          <p:cNvPr id="4" name="Picture 3" descr="ClassDiagram - Visual Paradigm Community Edition[Roy] (not for commercial use)">
             <a:extLst>
               <a:ext uri="{FF2B5EF4-FFF2-40B4-BE49-F238E27FC236}">
-                <a16:creationId xmlns:a16="http://schemas.microsoft.com/office/drawing/2014/main" id="{C45AC925-C150-47E9-A4BD-B1622EC8D8D8}"/>
+                <a16:creationId xmlns:a16="http://schemas.microsoft.com/office/drawing/2014/main" id="{6E82C625-B867-4F32-9969-BD4C48E92FCC}"/>
               </a:ext>
             </a:extLst>
           </p:cNvPr>
@@ -6641,15 +6743,53 @@
         </p:blipFill>
         <p:spPr>
           <a:xfrm>
-            <a:off x="866984" y="1796143"/>
-            <a:ext cx="9027857" cy="6796111"/>
+            <a:off x="-1508924" y="0"/>
+            <a:ext cx="15587373" cy="9753600"/>
           </a:xfrm>
           <a:prstGeom prst="rect">
             <a:avLst/>
           </a:prstGeom>
         </p:spPr>
       </p:pic>
+      <p:sp>
+        <p:nvSpPr>
+          <p:cNvPr id="2" name="Title 1">
+            <a:extLst>
+              <a:ext uri="{FF2B5EF4-FFF2-40B4-BE49-F238E27FC236}">
+                <a16:creationId xmlns:a16="http://schemas.microsoft.com/office/drawing/2014/main" id="{3B3389FB-D43F-4CBA-A12D-15030DCB330A}"/>
+              </a:ext>
+            </a:extLst>
+          </p:cNvPr>
+          <p:cNvSpPr>
+            <a:spLocks noGrp="1"/>
+          </p:cNvSpPr>
+          <p:nvPr>
+            <p:ph type="title"/>
+          </p:nvPr>
+        </p:nvSpPr>
+        <p:spPr>
+          <a:xfrm>
+            <a:off x="8061417" y="6732950"/>
+            <a:ext cx="9027858" cy="1878471"/>
+          </a:xfrm>
+        </p:spPr>
+        <p:txBody>
+          <a:bodyPr/>
+          <a:lstStyle/>
+          <a:p>
+            <a:r>
+              <a:rPr lang="en-US" dirty="0"/>
+              <a:t>Class Diagram</a:t>
+            </a:r>
+          </a:p>
+        </p:txBody>
+      </p:sp>
     </p:spTree>
+    <p:extLst>
+      <p:ext uri="{BB962C8B-B14F-4D97-AF65-F5344CB8AC3E}">
+        <p14:creationId xmlns:p14="http://schemas.microsoft.com/office/powerpoint/2010/main" val="2109142703"/>
+      </p:ext>
+    </p:extLst>
   </p:cSld>
   <p:clrMapOvr>
     <a:masterClrMapping/>
@@ -6659,7 +6799,7 @@
 </file>
 
 <file path=ppt/slides/slide11.xml><?xml version="1.0" encoding="utf-8"?>
-<p:sld xmlns:a="http://schemas.openxmlformats.org/drawingml/2006/main" xmlns:r="http://schemas.openxmlformats.org/officeDocument/2006/relationships" xmlns:p="http://schemas.openxmlformats.org/presentationml/2006/main" show="0">
+<p:sld xmlns:a="http://schemas.openxmlformats.org/drawingml/2006/main" xmlns:r="http://schemas.openxmlformats.org/officeDocument/2006/relationships" xmlns:p="http://schemas.openxmlformats.org/presentationml/2006/main">
   <p:cSld>
     <p:spTree>
       <p:nvGrpSpPr>
@@ -6677,8 +6817,14 @@
       </p:grpSpPr>
       <p:sp>
         <p:nvSpPr>
-          <p:cNvPr id="156" name="Title"/>
-          <p:cNvSpPr txBox="1">
+          <p:cNvPr id="2" name="Title 1">
+            <a:extLst>
+              <a:ext uri="{FF2B5EF4-FFF2-40B4-BE49-F238E27FC236}">
+                <a16:creationId xmlns:a16="http://schemas.microsoft.com/office/drawing/2014/main" id="{56057312-82E2-4C89-A907-6364B1C38460}"/>
+              </a:ext>
+            </a:extLst>
+          </p:cNvPr>
+          <p:cNvSpPr>
             <a:spLocks noGrp="1"/>
           </p:cNvSpPr>
           <p:nvPr>
@@ -6687,12 +6833,9 @@
         </p:nvSpPr>
         <p:spPr>
           <a:xfrm>
-            <a:off x="866986" y="823444"/>
-            <a:ext cx="9027858" cy="972699"/>
+            <a:off x="1460669" y="3937564"/>
+            <a:ext cx="9027858" cy="1878471"/>
           </a:xfrm>
-          <a:prstGeom prst="rect">
-            <a:avLst/>
-          </a:prstGeom>
         </p:spPr>
         <p:txBody>
           <a:bodyPr>
@@ -6702,49 +6845,24 @@
           <a:p>
             <a:r>
               <a:rPr lang="en-US" dirty="0"/>
-              <a:t>Driver/Vehicle Info Page Demo</a:t>
-            </a:r>
-            <a:endParaRPr dirty="0"/>
-          </a:p>
-        </p:txBody>
-      </p:sp>
-      <p:pic>
-        <p:nvPicPr>
-          <p:cNvPr id="3" name="Picture 2" descr="Design Preview [Driver_VehicleInfoGUI]">
-            <a:extLst>
-              <a:ext uri="{FF2B5EF4-FFF2-40B4-BE49-F238E27FC236}">
-                <a16:creationId xmlns:a16="http://schemas.microsoft.com/office/drawing/2014/main" id="{BC23EE55-5F0B-4519-881A-F7573F0D4197}"/>
-              </a:ext>
-            </a:extLst>
-          </p:cNvPr>
-          <p:cNvPicPr>
-            <a:picLocks noChangeAspect="1"/>
-          </p:cNvPicPr>
-          <p:nvPr/>
-        </p:nvPicPr>
-        <p:blipFill>
-          <a:blip r:embed="rId2">
-            <a:extLst>
-              <a:ext uri="{28A0092B-C50C-407E-A947-70E740481C1C}">
-                <a14:useLocalDpi xmlns:a14="http://schemas.microsoft.com/office/drawing/2010/main" val="0"/>
-              </a:ext>
-            </a:extLst>
-          </a:blip>
-          <a:stretch>
-            <a:fillRect/>
-          </a:stretch>
-        </p:blipFill>
-        <p:spPr>
-          <a:xfrm>
-            <a:off x="866986" y="1580111"/>
-            <a:ext cx="9237979" cy="6954289"/>
-          </a:xfrm>
-          <a:prstGeom prst="rect">
-            <a:avLst/>
-          </a:prstGeom>
-        </p:spPr>
-      </p:pic>
+              <a:t>Bear Rides</a:t>
+            </a:r>
+            <a:br>
+              <a:rPr lang="en-US" dirty="0"/>
+            </a:br>
+            <a:r>
+              <a:rPr lang="en-US" dirty="0"/>
+              <a:t>Application live demonstration</a:t>
+            </a:r>
+          </a:p>
+        </p:txBody>
+      </p:sp>
     </p:spTree>
+    <p:extLst>
+      <p:ext uri="{BB962C8B-B14F-4D97-AF65-F5344CB8AC3E}">
+        <p14:creationId xmlns:p14="http://schemas.microsoft.com/office/powerpoint/2010/main" val="956794991"/>
+      </p:ext>
+    </p:extLst>
   </p:cSld>
   <p:clrMapOvr>
     <a:masterClrMapping/>
@@ -6772,7 +6890,7 @@
       </p:grpSpPr>
       <p:sp>
         <p:nvSpPr>
-          <p:cNvPr id="156" name="Title"/>
+          <p:cNvPr id="148" name="Title"/>
           <p:cNvSpPr txBox="1">
             <a:spLocks noGrp="1"/>
           </p:cNvSpPr>
@@ -6782,8 +6900,8 @@
         </p:nvSpPr>
         <p:spPr>
           <a:xfrm>
-            <a:off x="866986" y="823444"/>
-            <a:ext cx="9027858" cy="972699"/>
+            <a:off x="769149" y="605731"/>
+            <a:ext cx="9027858" cy="940042"/>
           </a:xfrm>
           <a:prstGeom prst="rect">
             <a:avLst/>
@@ -6796,19 +6914,19 @@
           <a:lstStyle/>
           <a:p>
             <a:r>
-              <a:rPr lang="en-US" dirty="0"/>
-              <a:t>Message Board Demo</a:t>
-            </a:r>
-            <a:endParaRPr dirty="0"/>
+              <a:rPr lang="en-US" sz="4600"/>
+              <a:t>Login Page</a:t>
+            </a:r>
+            <a:endParaRPr lang="en-US" sz="4600" dirty="0"/>
           </a:p>
         </p:txBody>
       </p:sp>
       <p:pic>
         <p:nvPicPr>
-          <p:cNvPr id="6" name="Picture 5" descr="Design Preview [MessageBoardGUI]">
+          <p:cNvPr id="8" name="Picture 7">
             <a:extLst>
               <a:ext uri="{FF2B5EF4-FFF2-40B4-BE49-F238E27FC236}">
-                <a16:creationId xmlns:a16="http://schemas.microsoft.com/office/drawing/2014/main" id="{F1B513D0-8F3B-4AD3-88C5-E9E01A0F1BE8}"/>
+                <a16:creationId xmlns:a16="http://schemas.microsoft.com/office/drawing/2014/main" id="{8BF05D60-F9F2-4B81-AAA3-F56AA6820BB1}"/>
               </a:ext>
             </a:extLst>
           </p:cNvPr>
@@ -6831,8 +6949,8 @@
         </p:blipFill>
         <p:spPr>
           <a:xfrm>
-            <a:off x="866985" y="1796143"/>
-            <a:ext cx="9211293" cy="6934200"/>
+            <a:off x="769149" y="1545773"/>
+            <a:ext cx="9027858" cy="6896819"/>
           </a:xfrm>
           <a:prstGeom prst="rect">
             <a:avLst/>
@@ -6840,11 +6958,6 @@
         </p:spPr>
       </p:pic>
     </p:spTree>
-    <p:extLst>
-      <p:ext uri="{BB962C8B-B14F-4D97-AF65-F5344CB8AC3E}">
-        <p14:creationId xmlns:p14="http://schemas.microsoft.com/office/powerpoint/2010/main" val="1521440304"/>
-      </p:ext>
-    </p:extLst>
   </p:cSld>
   <p:clrMapOvr>
     <a:masterClrMapping/>
@@ -6872,7 +6985,7 @@
       </p:grpSpPr>
       <p:sp>
         <p:nvSpPr>
-          <p:cNvPr id="156" name="Title"/>
+          <p:cNvPr id="152" name="Title"/>
           <p:cNvSpPr txBox="1">
             <a:spLocks noGrp="1"/>
           </p:cNvSpPr>
@@ -6882,8 +6995,8 @@
         </p:nvSpPr>
         <p:spPr>
           <a:xfrm>
-            <a:off x="866986" y="823444"/>
-            <a:ext cx="9027858" cy="972699"/>
+            <a:off x="866985" y="866988"/>
+            <a:ext cx="9027858" cy="929156"/>
           </a:xfrm>
           <a:prstGeom prst="rect">
             <a:avLst/>
@@ -6891,24 +7004,27 @@
         </p:spPr>
         <p:txBody>
           <a:bodyPr>
-            <a:normAutofit/>
+            <a:normAutofit fontScale="90000"/>
           </a:bodyPr>
           <a:lstStyle/>
           <a:p>
             <a:r>
               <a:rPr lang="en-US" dirty="0"/>
-              <a:t>Message Page Demo</a:t>
-            </a:r>
+              <a:t>Register</a:t>
+            </a:r>
+            <a:br>
+              <a:rPr lang="en-US" dirty="0"/>
+            </a:br>
             <a:endParaRPr dirty="0"/>
           </a:p>
         </p:txBody>
       </p:sp>
       <p:pic>
         <p:nvPicPr>
-          <p:cNvPr id="3" name="Picture 2" descr="Design Preview [MessageGUI]">
+          <p:cNvPr id="3" name="Picture 2">
             <a:extLst>
               <a:ext uri="{FF2B5EF4-FFF2-40B4-BE49-F238E27FC236}">
-                <a16:creationId xmlns:a16="http://schemas.microsoft.com/office/drawing/2014/main" id="{1491A5CD-BCA7-4D99-A2F1-8B8672C5741F}"/>
+                <a16:creationId xmlns:a16="http://schemas.microsoft.com/office/drawing/2014/main" id="{463A937F-1614-4B61-A4D9-8F84AB096C31}"/>
               </a:ext>
             </a:extLst>
           </p:cNvPr>
@@ -6931,8 +7047,298 @@
         </p:blipFill>
         <p:spPr>
           <a:xfrm>
-            <a:off x="866985" y="1656310"/>
-            <a:ext cx="9147871" cy="6886456"/>
+            <a:off x="866985" y="1796144"/>
+            <a:ext cx="9360486" cy="7090468"/>
+          </a:xfrm>
+          <a:prstGeom prst="rect">
+            <a:avLst/>
+          </a:prstGeom>
+        </p:spPr>
+      </p:pic>
+    </p:spTree>
+  </p:cSld>
+  <p:clrMapOvr>
+    <a:masterClrMapping/>
+  </p:clrMapOvr>
+  <p:transition spd="med"/>
+</p:sld>
+</file>
+
+<file path=ppt/slides/slide14.xml><?xml version="1.0" encoding="utf-8"?>
+<p:sld xmlns:a="http://schemas.openxmlformats.org/drawingml/2006/main" xmlns:r="http://schemas.openxmlformats.org/officeDocument/2006/relationships" xmlns:p="http://schemas.openxmlformats.org/presentationml/2006/main" show="0">
+  <p:cSld>
+    <p:spTree>
+      <p:nvGrpSpPr>
+        <p:cNvPr id="1" name=""/>
+        <p:cNvGrpSpPr/>
+        <p:nvPr/>
+      </p:nvGrpSpPr>
+      <p:grpSpPr>
+        <a:xfrm>
+          <a:off x="0" y="0"/>
+          <a:ext cx="0" cy="0"/>
+          <a:chOff x="0" y="0"/>
+          <a:chExt cx="0" cy="0"/>
+        </a:xfrm>
+      </p:grpSpPr>
+      <p:sp>
+        <p:nvSpPr>
+          <p:cNvPr id="156" name="Title"/>
+          <p:cNvSpPr txBox="1">
+            <a:spLocks noGrp="1"/>
+          </p:cNvSpPr>
+          <p:nvPr>
+            <p:ph type="title"/>
+          </p:nvPr>
+        </p:nvSpPr>
+        <p:spPr>
+          <a:xfrm>
+            <a:off x="866986" y="823444"/>
+            <a:ext cx="9027858" cy="972699"/>
+          </a:xfrm>
+          <a:prstGeom prst="rect">
+            <a:avLst/>
+          </a:prstGeom>
+        </p:spPr>
+        <p:txBody>
+          <a:bodyPr>
+            <a:normAutofit/>
+          </a:bodyPr>
+          <a:lstStyle/>
+          <a:p>
+            <a:r>
+              <a:rPr lang="en-US" dirty="0"/>
+              <a:t>Home Page</a:t>
+            </a:r>
+            <a:endParaRPr dirty="0"/>
+          </a:p>
+        </p:txBody>
+      </p:sp>
+      <p:pic>
+        <p:nvPicPr>
+          <p:cNvPr id="4" name="Picture 3">
+            <a:extLst>
+              <a:ext uri="{FF2B5EF4-FFF2-40B4-BE49-F238E27FC236}">
+                <a16:creationId xmlns:a16="http://schemas.microsoft.com/office/drawing/2014/main" id="{50F34661-A581-467F-A28C-E6BB0A234664}"/>
+              </a:ext>
+            </a:extLst>
+          </p:cNvPr>
+          <p:cNvPicPr>
+            <a:picLocks noChangeAspect="1"/>
+          </p:cNvPicPr>
+          <p:nvPr/>
+        </p:nvPicPr>
+        <p:blipFill>
+          <a:blip r:embed="rId2">
+            <a:extLst>
+              <a:ext uri="{28A0092B-C50C-407E-A947-70E740481C1C}">
+                <a14:useLocalDpi xmlns:a14="http://schemas.microsoft.com/office/drawing/2010/main" val="0"/>
+              </a:ext>
+            </a:extLst>
+          </a:blip>
+          <a:stretch>
+            <a:fillRect/>
+          </a:stretch>
+        </p:blipFill>
+        <p:spPr>
+          <a:xfrm>
+            <a:off x="866986" y="1796143"/>
+            <a:ext cx="9435741" cy="7134013"/>
+          </a:xfrm>
+          <a:prstGeom prst="rect">
+            <a:avLst/>
+          </a:prstGeom>
+        </p:spPr>
+      </p:pic>
+    </p:spTree>
+  </p:cSld>
+  <p:clrMapOvr>
+    <a:masterClrMapping/>
+  </p:clrMapOvr>
+  <p:transition spd="med"/>
+</p:sld>
+</file>
+
+<file path=ppt/slides/slide15.xml><?xml version="1.0" encoding="utf-8"?>
+<p:sld xmlns:a="http://schemas.openxmlformats.org/drawingml/2006/main" xmlns:r="http://schemas.openxmlformats.org/officeDocument/2006/relationships" xmlns:p="http://schemas.openxmlformats.org/presentationml/2006/main" show="0">
+  <p:cSld>
+    <p:spTree>
+      <p:nvGrpSpPr>
+        <p:cNvPr id="1" name=""/>
+        <p:cNvGrpSpPr/>
+        <p:nvPr/>
+      </p:nvGrpSpPr>
+      <p:grpSpPr>
+        <a:xfrm>
+          <a:off x="0" y="0"/>
+          <a:ext cx="0" cy="0"/>
+          <a:chOff x="0" y="0"/>
+          <a:chExt cx="0" cy="0"/>
+        </a:xfrm>
+      </p:grpSpPr>
+      <p:sp>
+        <p:nvSpPr>
+          <p:cNvPr id="156" name="Title"/>
+          <p:cNvSpPr txBox="1">
+            <a:spLocks noGrp="1"/>
+          </p:cNvSpPr>
+          <p:nvPr>
+            <p:ph type="title"/>
+          </p:nvPr>
+        </p:nvSpPr>
+        <p:spPr>
+          <a:xfrm>
+            <a:off x="866986" y="823444"/>
+            <a:ext cx="9027858" cy="972699"/>
+          </a:xfrm>
+          <a:prstGeom prst="rect">
+            <a:avLst/>
+          </a:prstGeom>
+        </p:spPr>
+        <p:txBody>
+          <a:bodyPr>
+            <a:normAutofit/>
+          </a:bodyPr>
+          <a:lstStyle/>
+          <a:p>
+            <a:r>
+              <a:rPr lang="en-US" dirty="0"/>
+              <a:t>Message Board</a:t>
+            </a:r>
+            <a:endParaRPr dirty="0"/>
+          </a:p>
+        </p:txBody>
+      </p:sp>
+      <p:pic>
+        <p:nvPicPr>
+          <p:cNvPr id="3" name="Picture 2">
+            <a:extLst>
+              <a:ext uri="{FF2B5EF4-FFF2-40B4-BE49-F238E27FC236}">
+                <a16:creationId xmlns:a16="http://schemas.microsoft.com/office/drawing/2014/main" id="{AEF756F3-F69C-426C-B958-A60F14E20412}"/>
+              </a:ext>
+            </a:extLst>
+          </p:cNvPr>
+          <p:cNvPicPr>
+            <a:picLocks noChangeAspect="1"/>
+          </p:cNvPicPr>
+          <p:nvPr/>
+        </p:nvPicPr>
+        <p:blipFill>
+          <a:blip r:embed="rId2">
+            <a:extLst>
+              <a:ext uri="{28A0092B-C50C-407E-A947-70E740481C1C}">
+                <a14:useLocalDpi xmlns:a14="http://schemas.microsoft.com/office/drawing/2010/main" val="0"/>
+              </a:ext>
+            </a:extLst>
+          </a:blip>
+          <a:stretch>
+            <a:fillRect/>
+          </a:stretch>
+        </p:blipFill>
+        <p:spPr>
+          <a:xfrm>
+            <a:off x="866986" y="1796143"/>
+            <a:ext cx="9435741" cy="7134013"/>
+          </a:xfrm>
+          <a:prstGeom prst="rect">
+            <a:avLst/>
+          </a:prstGeom>
+        </p:spPr>
+      </p:pic>
+    </p:spTree>
+    <p:extLst>
+      <p:ext uri="{BB962C8B-B14F-4D97-AF65-F5344CB8AC3E}">
+        <p14:creationId xmlns:p14="http://schemas.microsoft.com/office/powerpoint/2010/main" val="1521440304"/>
+      </p:ext>
+    </p:extLst>
+  </p:cSld>
+  <p:clrMapOvr>
+    <a:masterClrMapping/>
+  </p:clrMapOvr>
+  <p:transition spd="med"/>
+</p:sld>
+</file>
+
+<file path=ppt/slides/slide16.xml><?xml version="1.0" encoding="utf-8"?>
+<p:sld xmlns:a="http://schemas.openxmlformats.org/drawingml/2006/main" xmlns:r="http://schemas.openxmlformats.org/officeDocument/2006/relationships" xmlns:p="http://schemas.openxmlformats.org/presentationml/2006/main" show="0">
+  <p:cSld>
+    <p:spTree>
+      <p:nvGrpSpPr>
+        <p:cNvPr id="1" name=""/>
+        <p:cNvGrpSpPr/>
+        <p:nvPr/>
+      </p:nvGrpSpPr>
+      <p:grpSpPr>
+        <a:xfrm>
+          <a:off x="0" y="0"/>
+          <a:ext cx="0" cy="0"/>
+          <a:chOff x="0" y="0"/>
+          <a:chExt cx="0" cy="0"/>
+        </a:xfrm>
+      </p:grpSpPr>
+      <p:sp>
+        <p:nvSpPr>
+          <p:cNvPr id="156" name="Title"/>
+          <p:cNvSpPr txBox="1">
+            <a:spLocks noGrp="1"/>
+          </p:cNvSpPr>
+          <p:nvPr>
+            <p:ph type="title"/>
+          </p:nvPr>
+        </p:nvSpPr>
+        <p:spPr>
+          <a:xfrm>
+            <a:off x="866986" y="823444"/>
+            <a:ext cx="9027858" cy="972699"/>
+          </a:xfrm>
+          <a:prstGeom prst="rect">
+            <a:avLst/>
+          </a:prstGeom>
+        </p:spPr>
+        <p:txBody>
+          <a:bodyPr>
+            <a:normAutofit/>
+          </a:bodyPr>
+          <a:lstStyle/>
+          <a:p>
+            <a:r>
+              <a:rPr lang="en-US" dirty="0"/>
+              <a:t>Message Page</a:t>
+            </a:r>
+            <a:endParaRPr dirty="0"/>
+          </a:p>
+        </p:txBody>
+      </p:sp>
+      <p:pic>
+        <p:nvPicPr>
+          <p:cNvPr id="4" name="Picture 3">
+            <a:extLst>
+              <a:ext uri="{FF2B5EF4-FFF2-40B4-BE49-F238E27FC236}">
+                <a16:creationId xmlns:a16="http://schemas.microsoft.com/office/drawing/2014/main" id="{02374FA4-B991-40E9-9CD4-510B2095CD29}"/>
+              </a:ext>
+            </a:extLst>
+          </p:cNvPr>
+          <p:cNvPicPr>
+            <a:picLocks noChangeAspect="1"/>
+          </p:cNvPicPr>
+          <p:nvPr/>
+        </p:nvPicPr>
+        <p:blipFill>
+          <a:blip r:embed="rId2">
+            <a:extLst>
+              <a:ext uri="{28A0092B-C50C-407E-A947-70E740481C1C}">
+                <a14:useLocalDpi xmlns:a14="http://schemas.microsoft.com/office/drawing/2010/main" val="0"/>
+              </a:ext>
+            </a:extLst>
+          </a:blip>
+          <a:stretch>
+            <a:fillRect/>
+          </a:stretch>
+        </p:blipFill>
+        <p:spPr>
+          <a:xfrm>
+            <a:off x="866986" y="1796143"/>
+            <a:ext cx="9404537" cy="7134013"/>
           </a:xfrm>
           <a:prstGeom prst="rect">
             <a:avLst/>
@@ -6953,13 +7359,13 @@
 </p:sld>
 </file>
 
-<file path=ppt/slides/slide14.xml><?xml version="1.0" encoding="utf-8"?>
+<file path=ppt/slides/slide17.xml><?xml version="1.0" encoding="utf-8"?>
 <p:sld xmlns:a="http://schemas.openxmlformats.org/drawingml/2006/main" xmlns:r="http://schemas.openxmlformats.org/officeDocument/2006/relationships" xmlns:p="http://schemas.openxmlformats.org/presentationml/2006/main">
   <p:cSld>
     <p:bg>
       <p:bgPr>
         <a:solidFill>
-          <a:schemeClr val="bg2"/>
+          <a:schemeClr val="bg1"/>
         </a:solidFill>
         <a:effectLst/>
       </p:bgPr>
@@ -7115,7 +7521,7 @@
         </p:cxnSp>
         <p:sp>
           <p:nvSpPr>
-            <p:cNvPr id="104" name="Rectangle 23">
+            <p:cNvPr id="162" name="Rectangle 23">
               <a:extLst>
                 <a:ext uri="{FF2B5EF4-FFF2-40B4-BE49-F238E27FC236}">
                   <a16:creationId xmlns:a16="http://schemas.microsoft.com/office/drawing/2014/main" id="{E7514DA3-59E7-409E-8A3B-AD097F6E5644}"/>
@@ -7193,7 +7599,7 @@
         </p:sp>
         <p:sp>
           <p:nvSpPr>
-            <p:cNvPr id="105" name="Rectangle 25">
+            <p:cNvPr id="163" name="Rectangle 25">
               <a:extLst>
                 <a:ext uri="{FF2B5EF4-FFF2-40B4-BE49-F238E27FC236}">
                   <a16:creationId xmlns:a16="http://schemas.microsoft.com/office/drawing/2014/main" id="{57B9A2A6-3BE4-4599-9364-F71C5BFD61F8}"/>
@@ -7271,7 +7677,7 @@
         </p:sp>
         <p:sp>
           <p:nvSpPr>
-            <p:cNvPr id="106" name="Isosceles Triangle 105">
+            <p:cNvPr id="164" name="Isosceles Triangle 105">
               <a:extLst>
                 <a:ext uri="{FF2B5EF4-FFF2-40B4-BE49-F238E27FC236}">
                   <a16:creationId xmlns:a16="http://schemas.microsoft.com/office/drawing/2014/main" id="{4FD744C6-4ED8-4BC9-BF68-6BDF701C5DB4}"/>
@@ -7327,7 +7733,7 @@
         </p:sp>
         <p:sp>
           <p:nvSpPr>
-            <p:cNvPr id="107" name="Rectangle 27">
+            <p:cNvPr id="165" name="Rectangle 27">
               <a:extLst>
                 <a:ext uri="{FF2B5EF4-FFF2-40B4-BE49-F238E27FC236}">
                   <a16:creationId xmlns:a16="http://schemas.microsoft.com/office/drawing/2014/main" id="{092C5BAD-C911-4F8F-A1C5-470268BE668B}"/>
@@ -7406,7 +7812,7 @@
         </p:sp>
         <p:sp>
           <p:nvSpPr>
-            <p:cNvPr id="108" name="Rectangle 28">
+            <p:cNvPr id="166" name="Rectangle 28">
               <a:extLst>
                 <a:ext uri="{FF2B5EF4-FFF2-40B4-BE49-F238E27FC236}">
                   <a16:creationId xmlns:a16="http://schemas.microsoft.com/office/drawing/2014/main" id="{B133D0C8-4EC4-424F-8E70-0482D5B1B653}"/>
@@ -7486,7 +7892,7 @@
         </p:sp>
         <p:sp>
           <p:nvSpPr>
-            <p:cNvPr id="109" name="Rectangle 29">
+            <p:cNvPr id="167" name="Rectangle 29">
               <a:extLst>
                 <a:ext uri="{FF2B5EF4-FFF2-40B4-BE49-F238E27FC236}">
                   <a16:creationId xmlns:a16="http://schemas.microsoft.com/office/drawing/2014/main" id="{7B1532A0-F4B3-4DE8-B18F-740CAAD25AC4}"/>
@@ -7564,7 +7970,7 @@
         </p:sp>
         <p:sp>
           <p:nvSpPr>
-            <p:cNvPr id="110" name="Isosceles Triangle 109">
+            <p:cNvPr id="168" name="Isosceles Triangle 109">
               <a:extLst>
                 <a:ext uri="{FF2B5EF4-FFF2-40B4-BE49-F238E27FC236}">
                   <a16:creationId xmlns:a16="http://schemas.microsoft.com/office/drawing/2014/main" id="{8EFDD162-BBBA-4062-8BBF-53DBA1091374}"/>
@@ -7620,7 +8026,7 @@
         </p:sp>
         <p:sp>
           <p:nvSpPr>
-            <p:cNvPr id="111" name="Isosceles Triangle 110">
+            <p:cNvPr id="169" name="Isosceles Triangle 110">
               <a:extLst>
                 <a:ext uri="{FF2B5EF4-FFF2-40B4-BE49-F238E27FC236}">
                   <a16:creationId xmlns:a16="http://schemas.microsoft.com/office/drawing/2014/main" id="{DCFC9E65-3E19-4483-B952-25D29683CA56}"/>
@@ -7680,7 +8086,7 @@
           <p:cNvPr id="113" name="Rectangle 112">
             <a:extLst>
               <a:ext uri="{FF2B5EF4-FFF2-40B4-BE49-F238E27FC236}">
-                <a16:creationId xmlns:a16="http://schemas.microsoft.com/office/drawing/2014/main" id="{27577DEC-D9A5-404D-9789-702F4319BEC8}"/>
+                <a16:creationId xmlns:a16="http://schemas.microsoft.com/office/drawing/2014/main" id="{2783C067-F8BF-4755-B516-8A0CD74CF60C}"/>
               </a:ext>
               <a:ext uri="{C183D7F6-B498-43B3-948B-1728B52AA6E4}">
                 <adec:decorative xmlns:adec="http://schemas.microsoft.com/office/drawing/2017/decorative" val="1"/>
@@ -7701,7 +8107,7 @@
         <p:spPr>
           <a:xfrm>
             <a:off x="0" y="0"/>
-            <a:ext cx="13004800" cy="9753600"/>
+            <a:ext cx="13004800" cy="9765641"/>
           </a:xfrm>
           <a:prstGeom prst="rect">
             <a:avLst/>
@@ -7737,6 +8143,303 @@
       </p:sp>
       <p:sp>
         <p:nvSpPr>
+          <p:cNvPr id="115" name="Isosceles Triangle 114">
+            <a:extLst>
+              <a:ext uri="{FF2B5EF4-FFF2-40B4-BE49-F238E27FC236}">
+                <a16:creationId xmlns:a16="http://schemas.microsoft.com/office/drawing/2014/main" id="{2ED796EC-E7FF-46DB-B912-FB08BF12AA6E}"/>
+              </a:ext>
+              <a:ext uri="{C183D7F6-B498-43B3-948B-1728B52AA6E4}">
+                <adec:decorative xmlns:adec="http://schemas.microsoft.com/office/drawing/2017/decorative" val="1"/>
+              </a:ext>
+            </a:extLst>
+          </p:cNvPr>
+          <p:cNvSpPr>
+            <a:spLocks noGrp="1" noRot="1" noChangeAspect="1" noMove="1" noResize="1" noEditPoints="1" noAdjustHandles="1" noChangeArrowheads="1" noChangeShapeType="1" noTextEdit="1"/>
+          </p:cNvSpPr>
+          <p:nvPr>
+            <p:extLst>
+              <p:ext uri="{386F3935-93C4-4BCD-93E2-E3B085C9AB24}">
+                <p16:designElem xmlns:p16="http://schemas.microsoft.com/office/powerpoint/2015/main" val="1"/>
+              </p:ext>
+            </p:extLst>
+          </p:nvPr>
+        </p:nvSpPr>
+        <p:spPr>
+          <a:xfrm rot="10800000">
+            <a:off x="0" y="0"/>
+            <a:ext cx="898769" cy="8058530"/>
+          </a:xfrm>
+          <a:prstGeom prst="triangle">
+            <a:avLst>
+              <a:gd name="adj" fmla="val 100000"/>
+            </a:avLst>
+          </a:prstGeom>
+          <a:solidFill>
+            <a:schemeClr val="accent1"/>
+          </a:solidFill>
+          <a:ln>
+            <a:noFill/>
+          </a:ln>
+          <a:effectLst/>
+        </p:spPr>
+        <p:style>
+          <a:lnRef idx="1">
+            <a:schemeClr val="accent1"/>
+          </a:lnRef>
+          <a:fillRef idx="3">
+            <a:schemeClr val="accent1"/>
+          </a:fillRef>
+          <a:effectRef idx="2">
+            <a:schemeClr val="accent1"/>
+          </a:effectRef>
+          <a:fontRef idx="minor">
+            <a:schemeClr val="lt1"/>
+          </a:fontRef>
+        </p:style>
+      </p:sp>
+      <p:sp>
+        <p:nvSpPr>
+          <p:cNvPr id="117" name="Rectangle 27">
+            <a:extLst>
+              <a:ext uri="{FF2B5EF4-FFF2-40B4-BE49-F238E27FC236}">
+                <a16:creationId xmlns:a16="http://schemas.microsoft.com/office/drawing/2014/main" id="{0819F787-32B4-46A8-BC57-C6571BCEE243}"/>
+              </a:ext>
+              <a:ext uri="{C183D7F6-B498-43B3-948B-1728B52AA6E4}">
+                <adec:decorative xmlns:adec="http://schemas.microsoft.com/office/drawing/2017/decorative" val="1"/>
+              </a:ext>
+            </a:extLst>
+          </p:cNvPr>
+          <p:cNvSpPr>
+            <a:spLocks noGrp="1" noRot="1" noChangeAspect="1" noMove="1" noResize="1" noEditPoints="1" noAdjustHandles="1" noChangeArrowheads="1" noChangeShapeType="1" noTextEdit="1"/>
+          </p:cNvSpPr>
+          <p:nvPr>
+            <p:extLst>
+              <p:ext uri="{386F3935-93C4-4BCD-93E2-E3B085C9AB24}">
+                <p16:designElem xmlns:p16="http://schemas.microsoft.com/office/powerpoint/2015/main" val="1"/>
+              </p:ext>
+            </p:extLst>
+          </p:nvPr>
+        </p:nvSpPr>
+        <p:spPr>
+          <a:xfrm>
+            <a:off x="11120683" y="0"/>
+            <a:ext cx="1884117" cy="9753600"/>
+          </a:xfrm>
+          <a:custGeom>
+            <a:avLst/>
+            <a:gdLst/>
+            <a:ahLst/>
+            <a:cxnLst/>
+            <a:rect l="l" t="t" r="r" b="b"/>
+            <a:pathLst>
+              <a:path w="2858013" h="6866467">
+                <a:moveTo>
+                  <a:pt x="0" y="0"/>
+                </a:moveTo>
+                <a:lnTo>
+                  <a:pt x="2858013" y="0"/>
+                </a:lnTo>
+                <a:lnTo>
+                  <a:pt x="2858013" y="6866467"/>
+                </a:lnTo>
+                <a:lnTo>
+                  <a:pt x="2473942" y="6866467"/>
+                </a:lnTo>
+                <a:lnTo>
+                  <a:pt x="0" y="0"/>
+                </a:lnTo>
+                <a:close/>
+              </a:path>
+            </a:pathLst>
+          </a:custGeom>
+          <a:solidFill>
+            <a:schemeClr val="accent2"/>
+          </a:solidFill>
+          <a:ln>
+            <a:noFill/>
+          </a:ln>
+          <a:effectLst/>
+        </p:spPr>
+        <p:style>
+          <a:lnRef idx="1">
+            <a:schemeClr val="accent1"/>
+          </a:lnRef>
+          <a:fillRef idx="3">
+            <a:schemeClr val="accent1"/>
+          </a:fillRef>
+          <a:effectRef idx="2">
+            <a:schemeClr val="accent1"/>
+          </a:effectRef>
+          <a:fontRef idx="minor">
+            <a:schemeClr val="lt1"/>
+          </a:fontRef>
+        </p:style>
+      </p:sp>
+      <p:sp>
+        <p:nvSpPr>
+          <p:cNvPr id="170" name="Isosceles Triangle 118">
+            <a:extLst>
+              <a:ext uri="{FF2B5EF4-FFF2-40B4-BE49-F238E27FC236}">
+                <a16:creationId xmlns:a16="http://schemas.microsoft.com/office/drawing/2014/main" id="{549A2DAB-B431-487D-95AD-BB0FECB49E57}"/>
+              </a:ext>
+              <a:ext uri="{C183D7F6-B498-43B3-948B-1728B52AA6E4}">
+                <adec:decorative xmlns:adec="http://schemas.microsoft.com/office/drawing/2017/decorative" val="1"/>
+              </a:ext>
+            </a:extLst>
+          </p:cNvPr>
+          <p:cNvSpPr>
+            <a:spLocks noGrp="1" noRot="1" noChangeAspect="1" noMove="1" noResize="1" noEditPoints="1" noAdjustHandles="1" noChangeArrowheads="1" noChangeShapeType="1" noTextEdit="1"/>
+          </p:cNvSpPr>
+          <p:nvPr>
+            <p:extLst>
+              <p:ext uri="{386F3935-93C4-4BCD-93E2-E3B085C9AB24}">
+                <p16:designElem xmlns:p16="http://schemas.microsoft.com/office/powerpoint/2015/main" val="1"/>
+              </p:ext>
+            </p:extLst>
+          </p:nvPr>
+        </p:nvSpPr>
+        <p:spPr>
+          <a:xfrm>
+            <a:off x="8254436" y="5430708"/>
+            <a:ext cx="4746978" cy="4322892"/>
+          </a:xfrm>
+          <a:prstGeom prst="triangle">
+            <a:avLst>
+              <a:gd name="adj" fmla="val 100000"/>
+            </a:avLst>
+          </a:prstGeom>
+          <a:solidFill>
+            <a:schemeClr val="accent3">
+              <a:alpha val="88000"/>
+            </a:schemeClr>
+          </a:solidFill>
+          <a:ln>
+            <a:noFill/>
+          </a:ln>
+          <a:effectLst/>
+        </p:spPr>
+        <p:style>
+          <a:lnRef idx="1">
+            <a:schemeClr val="accent1"/>
+          </a:lnRef>
+          <a:fillRef idx="3">
+            <a:schemeClr val="accent1"/>
+          </a:fillRef>
+          <a:effectRef idx="2">
+            <a:schemeClr val="accent1"/>
+          </a:effectRef>
+          <a:fontRef idx="minor">
+            <a:schemeClr val="lt1"/>
+          </a:fontRef>
+        </p:style>
+      </p:sp>
+      <p:cxnSp>
+        <p:nvCxnSpPr>
+          <p:cNvPr id="171" name="Straight Connector 120">
+            <a:extLst>
+              <a:ext uri="{FF2B5EF4-FFF2-40B4-BE49-F238E27FC236}">
+                <a16:creationId xmlns:a16="http://schemas.microsoft.com/office/drawing/2014/main" id="{C5ECDEE1-7093-418F-9CF5-24EEB115C1C1}"/>
+              </a:ext>
+              <a:ext uri="{C183D7F6-B498-43B3-948B-1728B52AA6E4}">
+                <adec:decorative xmlns:adec="http://schemas.microsoft.com/office/drawing/2017/decorative" val="1"/>
+              </a:ext>
+            </a:extLst>
+          </p:cNvPr>
+          <p:cNvCxnSpPr>
+            <a:cxnSpLocks noGrp="1" noRot="1" noChangeAspect="1" noMove="1" noResize="1" noEditPoints="1" noAdjustHandles="1" noChangeArrowheads="1" noChangeShapeType="1"/>
+          </p:cNvCxnSpPr>
+          <p:nvPr>
+            <p:extLst>
+              <p:ext uri="{386F3935-93C4-4BCD-93E2-E3B085C9AB24}">
+                <p16:designElem xmlns:p16="http://schemas.microsoft.com/office/powerpoint/2015/main" val="1"/>
+              </p:ext>
+            </p:extLst>
+          </p:nvPr>
+        </p:nvCxnSpPr>
+        <p:spPr>
+          <a:xfrm>
+            <a:off x="10810240" y="0"/>
+            <a:ext cx="1842346" cy="9753600"/>
+          </a:xfrm>
+          <a:prstGeom prst="line">
+            <a:avLst/>
+          </a:prstGeom>
+          <a:ln w="15875" cap="sq">
+            <a:solidFill>
+              <a:schemeClr val="accent2"/>
+            </a:solidFill>
+            <a:bevel/>
+          </a:ln>
+        </p:spPr>
+        <p:style>
+          <a:lnRef idx="2">
+            <a:schemeClr val="accent1"/>
+          </a:lnRef>
+          <a:fillRef idx="0">
+            <a:schemeClr val="accent1"/>
+          </a:fillRef>
+          <a:effectRef idx="1">
+            <a:schemeClr val="accent1"/>
+          </a:effectRef>
+          <a:fontRef idx="minor">
+            <a:schemeClr val="tx1"/>
+          </a:fontRef>
+        </p:style>
+      </p:cxnSp>
+      <p:cxnSp>
+        <p:nvCxnSpPr>
+          <p:cNvPr id="172" name="Straight Connector 122">
+            <a:extLst>
+              <a:ext uri="{FF2B5EF4-FFF2-40B4-BE49-F238E27FC236}">
+                <a16:creationId xmlns:a16="http://schemas.microsoft.com/office/drawing/2014/main" id="{045062AF-EB11-4651-BC4A-4DA21768DE8E}"/>
+              </a:ext>
+              <a:ext uri="{C183D7F6-B498-43B3-948B-1728B52AA6E4}">
+                <adec:decorative xmlns:adec="http://schemas.microsoft.com/office/drawing/2017/decorative" val="1"/>
+              </a:ext>
+            </a:extLst>
+          </p:cNvPr>
+          <p:cNvCxnSpPr>
+            <a:cxnSpLocks noGrp="1" noRot="1" noChangeAspect="1" noMove="1" noResize="1" noEditPoints="1" noAdjustHandles="1" noChangeArrowheads="1" noChangeShapeType="1"/>
+          </p:cNvCxnSpPr>
+          <p:nvPr>
+            <p:extLst>
+              <p:ext uri="{386F3935-93C4-4BCD-93E2-E3B085C9AB24}">
+                <p16:designElem xmlns:p16="http://schemas.microsoft.com/office/powerpoint/2015/main" val="1"/>
+              </p:ext>
+            </p:extLst>
+          </p:nvPr>
+        </p:nvCxnSpPr>
+        <p:spPr>
+          <a:xfrm flipH="1">
+            <a:off x="7920284" y="5235787"/>
+            <a:ext cx="5081129" cy="4517813"/>
+          </a:xfrm>
+          <a:prstGeom prst="line">
+            <a:avLst/>
+          </a:prstGeom>
+          <a:ln w="15875">
+            <a:solidFill>
+              <a:schemeClr val="accent1"/>
+            </a:solidFill>
+          </a:ln>
+        </p:spPr>
+        <p:style>
+          <a:lnRef idx="2">
+            <a:schemeClr val="accent1"/>
+          </a:lnRef>
+          <a:fillRef idx="0">
+            <a:schemeClr val="accent1"/>
+          </a:fillRef>
+          <a:effectRef idx="1">
+            <a:schemeClr val="accent1"/>
+          </a:effectRef>
+          <a:fontRef idx="minor">
+            <a:schemeClr val="tx1"/>
+          </a:fontRef>
+        </p:style>
+      </p:cxnSp>
+      <p:sp>
+        <p:nvSpPr>
           <p:cNvPr id="160" name="Thank you!…"/>
           <p:cNvSpPr txBox="1">
             <a:spLocks noGrp="1"/>
@@ -7747,8 +8450,8 @@
         </p:nvSpPr>
         <p:spPr>
           <a:xfrm>
-            <a:off x="1607538" y="3419781"/>
-            <a:ext cx="8284731" cy="2341407"/>
+            <a:off x="1870651" y="3070291"/>
+            <a:ext cx="8857976" cy="2517245"/>
           </a:xfrm>
           <a:prstGeom prst="rect">
             <a:avLst/>
@@ -7772,13 +8475,13 @@
               </a:defRPr>
             </a:pPr>
             <a:r>
-              <a:rPr lang="en-US" sz="3000" dirty="0"/>
+              <a:rPr lang="en-US" sz="4200" dirty="0"/>
               <a:t>Thank you</a:t>
             </a:r>
             <a:br>
-              <a:rPr lang="en-US" sz="3000" dirty="0"/>
+              <a:rPr lang="en-US" sz="4200" dirty="0"/>
             </a:br>
-            <a:endParaRPr lang="en-US" sz="3000" dirty="0"/>
+            <a:endParaRPr lang="en-US" sz="4200" dirty="0"/>
           </a:p>
           <a:p>
             <a:pPr algn="ctr" defTabSz="457200">
@@ -7788,33 +8491,1386 @@
               <a:defRPr sz="5040" u="sng"/>
             </a:pPr>
             <a:r>
-              <a:rPr lang="en-US" sz="3000" u="none" dirty="0"/>
+              <a:rPr lang="en-US" sz="3200" u="none" dirty="0"/>
               <a:t>Our website: </a:t>
             </a:r>
-          </a:p>
-          <a:p>
-            <a:pPr algn="ctr" defTabSz="457200">
-              <a:lnSpc>
-                <a:spcPct val="90000"/>
-              </a:lnSpc>
-              <a:defRPr sz="5040" u="sng"/>
-            </a:pPr>
-            <a:r>
-              <a:rPr lang="en-US" sz="3000" dirty="0">
+            <a:r>
+              <a:rPr lang="en-US" sz="3200" dirty="0">
                 <a:hlinkClick r:id="rId2"/>
               </a:rPr>
               <a:t>http://cs.baylor.edu/~snavely/</a:t>
             </a:r>
-            <a:endParaRPr lang="en-US" sz="3000" dirty="0"/>
-          </a:p>
-        </p:txBody>
-      </p:sp>
+            <a:endParaRPr lang="en-US" sz="3200" dirty="0"/>
+          </a:p>
+        </p:txBody>
+      </p:sp>
+    </p:spTree>
+  </p:cSld>
+  <p:clrMapOvr>
+    <a:masterClrMapping/>
+  </p:clrMapOvr>
+</p:sld>
+</file>
+
+<file path=ppt/slides/slide2.xml><?xml version="1.0" encoding="utf-8"?>
+<p:sld xmlns:a="http://schemas.openxmlformats.org/drawingml/2006/main" xmlns:r="http://schemas.openxmlformats.org/officeDocument/2006/relationships" xmlns:p="http://schemas.openxmlformats.org/presentationml/2006/main">
+  <p:cSld>
+    <p:spTree>
+      <p:nvGrpSpPr>
+        <p:cNvPr id="1" name=""/>
+        <p:cNvGrpSpPr/>
+        <p:nvPr/>
+      </p:nvGrpSpPr>
+      <p:grpSpPr>
+        <a:xfrm>
+          <a:off x="0" y="0"/>
+          <a:ext cx="0" cy="0"/>
+          <a:chOff x="0" y="0"/>
+          <a:chExt cx="0" cy="0"/>
+        </a:xfrm>
+      </p:grpSpPr>
+      <p:sp>
+        <p:nvSpPr>
+          <p:cNvPr id="129" name="System Sequence Diagram"/>
+          <p:cNvSpPr txBox="1">
+            <a:spLocks noGrp="1"/>
+          </p:cNvSpPr>
+          <p:nvPr>
+            <p:ph type="title"/>
+          </p:nvPr>
+        </p:nvSpPr>
+        <p:spPr>
+          <a:xfrm>
+            <a:off x="4950665" y="1452863"/>
+            <a:ext cx="5851071" cy="1044073"/>
+          </a:xfrm>
+          <a:prstGeom prst="rect">
+            <a:avLst/>
+          </a:prstGeom>
+        </p:spPr>
+        <p:txBody>
+          <a:bodyPr>
+            <a:normAutofit/>
+          </a:bodyPr>
+          <a:lstStyle>
+            <a:lvl1pPr defTabSz="502412">
+              <a:defRPr sz="6880"/>
+            </a:lvl1pPr>
+          </a:lstStyle>
+          <a:p>
+            <a:r>
+              <a:rPr lang="en-US" sz="6000" dirty="0"/>
+              <a:t>Implementation</a:t>
+            </a:r>
+            <a:endParaRPr sz="6000" dirty="0"/>
+          </a:p>
+        </p:txBody>
+      </p:sp>
+      <p:sp>
+        <p:nvSpPr>
+          <p:cNvPr id="2" name="TextBox 1">
+            <a:extLst>
+              <a:ext uri="{FF2B5EF4-FFF2-40B4-BE49-F238E27FC236}">
+                <a16:creationId xmlns:a16="http://schemas.microsoft.com/office/drawing/2014/main" id="{AF146942-3CE3-4127-9BC3-0E813EB5EC8B}"/>
+              </a:ext>
+            </a:extLst>
+          </p:cNvPr>
+          <p:cNvSpPr txBox="1"/>
+          <p:nvPr/>
+        </p:nvSpPr>
+        <p:spPr>
+          <a:xfrm>
+            <a:off x="5414194" y="2496936"/>
+            <a:ext cx="5101948" cy="369332"/>
+          </a:xfrm>
+          <a:prstGeom prst="rect">
+            <a:avLst/>
+          </a:prstGeom>
+          <a:noFill/>
+        </p:spPr>
+        <p:txBody>
+          <a:bodyPr wrap="square" rtlCol="0">
+            <a:spAutoFit/>
+          </a:bodyPr>
+          <a:lstStyle/>
+          <a:p>
+            <a:r>
+              <a:rPr lang="en-US" dirty="0"/>
+              <a:t>GUI – Controller – Panel Manager -  Database</a:t>
+            </a:r>
+          </a:p>
+        </p:txBody>
+      </p:sp>
+      <p:sp>
+        <p:nvSpPr>
+          <p:cNvPr id="3" name="TextBox 2">
+            <a:extLst>
+              <a:ext uri="{FF2B5EF4-FFF2-40B4-BE49-F238E27FC236}">
+                <a16:creationId xmlns:a16="http://schemas.microsoft.com/office/drawing/2014/main" id="{C6AE7955-69A7-4E5C-9382-6EB81A99E384}"/>
+              </a:ext>
+            </a:extLst>
+          </p:cNvPr>
+          <p:cNvSpPr txBox="1"/>
+          <p:nvPr/>
+        </p:nvSpPr>
+        <p:spPr>
+          <a:xfrm>
+            <a:off x="4950664" y="3735105"/>
+            <a:ext cx="5851072" cy="4431983"/>
+          </a:xfrm>
+          <a:prstGeom prst="rect">
+            <a:avLst/>
+          </a:prstGeom>
+          <a:noFill/>
+        </p:spPr>
+        <p:txBody>
+          <a:bodyPr wrap="square" rtlCol="0">
+            <a:spAutoFit/>
+          </a:bodyPr>
+          <a:lstStyle/>
+          <a:p>
+            <a:r>
+              <a:rPr lang="en-US" sz="2400" dirty="0"/>
+              <a:t>We build our base objects first, so we can have a frame of our software, </a:t>
+            </a:r>
+          </a:p>
+          <a:p>
+            <a:r>
+              <a:rPr lang="en-US" sz="2400" dirty="0"/>
+              <a:t>at the same time we are building a graphical user interface with Swing. </a:t>
+            </a:r>
+          </a:p>
+          <a:p>
+            <a:r>
+              <a:rPr lang="en-US" sz="2400" dirty="0"/>
+              <a:t>After its frame finished, we consider how to link its internal data altogether. </a:t>
+            </a:r>
+          </a:p>
+          <a:p>
+            <a:r>
+              <a:rPr lang="en-US" sz="2400" dirty="0"/>
+              <a:t>We used Model Controller View (MVC) structure, with complicated database. </a:t>
+            </a:r>
+          </a:p>
+          <a:p>
+            <a:r>
+              <a:rPr lang="en-US" sz="2400" dirty="0"/>
+              <a:t>This software add user input to its database and other user can view its data.</a:t>
+            </a:r>
+          </a:p>
+          <a:p>
+            <a:endParaRPr lang="en-US" dirty="0"/>
+          </a:p>
+        </p:txBody>
+      </p:sp>
+      <p:pic>
+        <p:nvPicPr>
+          <p:cNvPr id="6" name="Picture 5">
+            <a:extLst>
+              <a:ext uri="{FF2B5EF4-FFF2-40B4-BE49-F238E27FC236}">
+                <a16:creationId xmlns:a16="http://schemas.microsoft.com/office/drawing/2014/main" id="{3B5C9056-EAA9-42C8-84FF-B4EE19FA0F70}"/>
+              </a:ext>
+            </a:extLst>
+          </p:cNvPr>
+          <p:cNvPicPr>
+            <a:picLocks noChangeAspect="1"/>
+          </p:cNvPicPr>
+          <p:nvPr/>
+        </p:nvPicPr>
+        <p:blipFill>
+          <a:blip r:embed="rId2">
+            <a:extLst>
+              <a:ext uri="{28A0092B-C50C-407E-A947-70E740481C1C}">
+                <a14:useLocalDpi xmlns:a14="http://schemas.microsoft.com/office/drawing/2010/main" val="0"/>
+              </a:ext>
+            </a:extLst>
+          </a:blip>
+          <a:stretch>
+            <a:fillRect/>
+          </a:stretch>
+        </p:blipFill>
+        <p:spPr>
+          <a:xfrm>
+            <a:off x="595502" y="0"/>
+            <a:ext cx="4069568" cy="9888669"/>
+          </a:xfrm>
+          <a:prstGeom prst="rect">
+            <a:avLst/>
+          </a:prstGeom>
+        </p:spPr>
+      </p:pic>
+    </p:spTree>
+  </p:cSld>
+  <p:clrMapOvr>
+    <a:masterClrMapping/>
+  </p:clrMapOvr>
+  <p:transition spd="med"/>
+  <p:timing>
+    <p:tnLst>
+      <p:par>
+        <p:cTn id="1" dur="indefinite" restart="never" nodeType="tmRoot">
+          <p:childTnLst>
+            <p:seq concurrent="1" nextAc="seek">
+              <p:cTn id="2" dur="indefinite" nodeType="mainSeq">
+                <p:childTnLst>
+                  <p:par>
+                    <p:cTn id="3" fill="hold">
+                      <p:stCondLst>
+                        <p:cond delay="indefinite"/>
+                      </p:stCondLst>
+                      <p:childTnLst>
+                        <p:par>
+                          <p:cTn id="4" fill="hold">
+                            <p:stCondLst>
+                              <p:cond delay="0"/>
+                            </p:stCondLst>
+                            <p:childTnLst>
+                              <p:par>
+                                <p:cTn id="5" presetID="2" presetClass="entr" presetSubtype="4" fill="hold" nodeType="clickEffect">
+                                  <p:stCondLst>
+                                    <p:cond delay="0"/>
+                                  </p:stCondLst>
+                                  <p:childTnLst>
+                                    <p:set>
+                                      <p:cBhvr>
+                                        <p:cTn id="6" dur="1" fill="hold">
+                                          <p:stCondLst>
+                                            <p:cond delay="0"/>
+                                          </p:stCondLst>
+                                        </p:cTn>
+                                        <p:tgtEl>
+                                          <p:spTgt spid="6"/>
+                                        </p:tgtEl>
+                                        <p:attrNameLst>
+                                          <p:attrName>style.visibility</p:attrName>
+                                        </p:attrNameLst>
+                                      </p:cBhvr>
+                                      <p:to>
+                                        <p:strVal val="visible"/>
+                                      </p:to>
+                                    </p:set>
+                                    <p:anim calcmode="lin" valueType="num">
+                                      <p:cBhvr additive="base">
+                                        <p:cTn id="7" dur="500" fill="hold"/>
+                                        <p:tgtEl>
+                                          <p:spTgt spid="6"/>
+                                        </p:tgtEl>
+                                        <p:attrNameLst>
+                                          <p:attrName>ppt_x</p:attrName>
+                                        </p:attrNameLst>
+                                      </p:cBhvr>
+                                      <p:tavLst>
+                                        <p:tav tm="0">
+                                          <p:val>
+                                            <p:strVal val="#ppt_x"/>
+                                          </p:val>
+                                        </p:tav>
+                                        <p:tav tm="100000">
+                                          <p:val>
+                                            <p:strVal val="#ppt_x"/>
+                                          </p:val>
+                                        </p:tav>
+                                      </p:tavLst>
+                                    </p:anim>
+                                    <p:anim calcmode="lin" valueType="num">
+                                      <p:cBhvr additive="base">
+                                        <p:cTn id="8" dur="500" fill="hold"/>
+                                        <p:tgtEl>
+                                          <p:spTgt spid="6"/>
+                                        </p:tgtEl>
+                                        <p:attrNameLst>
+                                          <p:attrName>ppt_y</p:attrName>
+                                        </p:attrNameLst>
+                                      </p:cBhvr>
+                                      <p:tavLst>
+                                        <p:tav tm="0">
+                                          <p:val>
+                                            <p:strVal val="1+#ppt_h/2"/>
+                                          </p:val>
+                                        </p:tav>
+                                        <p:tav tm="100000">
+                                          <p:val>
+                                            <p:strVal val="#ppt_y"/>
+                                          </p:val>
+                                        </p:tav>
+                                      </p:tavLst>
+                                    </p:anim>
+                                  </p:childTnLst>
+                                </p:cTn>
+                              </p:par>
+                            </p:childTnLst>
+                          </p:cTn>
+                        </p:par>
+                      </p:childTnLst>
+                    </p:cTn>
+                  </p:par>
+                </p:childTnLst>
+              </p:cTn>
+              <p:prevCondLst>
+                <p:cond evt="onPrev" delay="0">
+                  <p:tgtEl>
+                    <p:sldTgt/>
+                  </p:tgtEl>
+                </p:cond>
+              </p:prevCondLst>
+              <p:nextCondLst>
+                <p:cond evt="onNext" delay="0">
+                  <p:tgtEl>
+                    <p:sldTgt/>
+                  </p:tgtEl>
+                </p:cond>
+              </p:nextCondLst>
+            </p:seq>
+          </p:childTnLst>
+        </p:cTn>
+      </p:par>
+    </p:tnLst>
+  </p:timing>
+</p:sld>
+</file>
+
+<file path=ppt/slides/slide3.xml><?xml version="1.0" encoding="utf-8"?>
+<p:sld xmlns:a="http://schemas.openxmlformats.org/drawingml/2006/main" xmlns:r="http://schemas.openxmlformats.org/officeDocument/2006/relationships" xmlns:p="http://schemas.openxmlformats.org/presentationml/2006/main">
+  <p:cSld>
+    <p:spTree>
+      <p:nvGrpSpPr>
+        <p:cNvPr id="1" name=""/>
+        <p:cNvGrpSpPr/>
+        <p:nvPr/>
+      </p:nvGrpSpPr>
+      <p:grpSpPr>
+        <a:xfrm>
+          <a:off x="0" y="0"/>
+          <a:ext cx="0" cy="0"/>
+          <a:chOff x="0" y="0"/>
+          <a:chExt cx="0" cy="0"/>
+        </a:xfrm>
+      </p:grpSpPr>
+      <p:sp>
+        <p:nvSpPr>
+          <p:cNvPr id="129" name="System Sequence Diagram"/>
+          <p:cNvSpPr txBox="1">
+            <a:spLocks noGrp="1"/>
+          </p:cNvSpPr>
+          <p:nvPr>
+            <p:ph type="title"/>
+          </p:nvPr>
+        </p:nvSpPr>
+        <p:spPr>
+          <a:xfrm>
+            <a:off x="651329" y="486704"/>
+            <a:ext cx="5851071" cy="1044073"/>
+          </a:xfrm>
+          <a:prstGeom prst="rect">
+            <a:avLst/>
+          </a:prstGeom>
+        </p:spPr>
+        <p:txBody>
+          <a:bodyPr>
+            <a:normAutofit/>
+          </a:bodyPr>
+          <a:lstStyle>
+            <a:lvl1pPr defTabSz="502412">
+              <a:defRPr sz="6880"/>
+            </a:lvl1pPr>
+          </a:lstStyle>
+          <a:p>
+            <a:r>
+              <a:rPr lang="en-US" sz="6000" dirty="0"/>
+              <a:t>Maven POM</a:t>
+            </a:r>
+            <a:endParaRPr sz="6000" dirty="0"/>
+          </a:p>
+        </p:txBody>
+      </p:sp>
+      <p:pic>
+        <p:nvPicPr>
+          <p:cNvPr id="7" name="Picture 6">
+            <a:extLst>
+              <a:ext uri="{FF2B5EF4-FFF2-40B4-BE49-F238E27FC236}">
+                <a16:creationId xmlns:a16="http://schemas.microsoft.com/office/drawing/2014/main" id="{7DE768DC-3E40-439C-912B-7B7B7BCAB3B5}"/>
+              </a:ext>
+            </a:extLst>
+          </p:cNvPr>
+          <p:cNvPicPr>
+            <a:picLocks noChangeAspect="1"/>
+          </p:cNvPicPr>
+          <p:nvPr/>
+        </p:nvPicPr>
+        <p:blipFill>
+          <a:blip r:embed="rId2">
+            <a:extLst>
+              <a:ext uri="{28A0092B-C50C-407E-A947-70E740481C1C}">
+                <a14:useLocalDpi xmlns:a14="http://schemas.microsoft.com/office/drawing/2010/main" val="0"/>
+              </a:ext>
+            </a:extLst>
+          </a:blip>
+          <a:stretch>
+            <a:fillRect/>
+          </a:stretch>
+        </p:blipFill>
+        <p:spPr>
+          <a:xfrm>
+            <a:off x="4773801" y="0"/>
+            <a:ext cx="5135605" cy="2889634"/>
+          </a:xfrm>
+          <a:prstGeom prst="rect">
+            <a:avLst/>
+          </a:prstGeom>
+        </p:spPr>
+      </p:pic>
+      <p:pic>
+        <p:nvPicPr>
+          <p:cNvPr id="5" name="Picture 4">
+            <a:extLst>
+              <a:ext uri="{FF2B5EF4-FFF2-40B4-BE49-F238E27FC236}">
+                <a16:creationId xmlns:a16="http://schemas.microsoft.com/office/drawing/2014/main" id="{73E78045-AB8E-4772-BE60-16C9A198144B}"/>
+              </a:ext>
+            </a:extLst>
+          </p:cNvPr>
+          <p:cNvPicPr>
+            <a:picLocks noChangeAspect="1"/>
+          </p:cNvPicPr>
+          <p:nvPr/>
+        </p:nvPicPr>
+        <p:blipFill>
+          <a:blip r:embed="rId3">
+            <a:extLst>
+              <a:ext uri="{28A0092B-C50C-407E-A947-70E740481C1C}">
+                <a14:useLocalDpi xmlns:a14="http://schemas.microsoft.com/office/drawing/2010/main" val="0"/>
+              </a:ext>
+            </a:extLst>
+          </a:blip>
+          <a:stretch>
+            <a:fillRect/>
+          </a:stretch>
+        </p:blipFill>
+        <p:spPr>
+          <a:xfrm>
+            <a:off x="278957" y="2427293"/>
+            <a:ext cx="4867217" cy="4333674"/>
+          </a:xfrm>
+          <a:prstGeom prst="rect">
+            <a:avLst/>
+          </a:prstGeom>
+        </p:spPr>
+      </p:pic>
+      <p:pic>
+        <p:nvPicPr>
+          <p:cNvPr id="9" name="Picture 8">
+            <a:extLst>
+              <a:ext uri="{FF2B5EF4-FFF2-40B4-BE49-F238E27FC236}">
+                <a16:creationId xmlns:a16="http://schemas.microsoft.com/office/drawing/2014/main" id="{CDB95A75-D6B4-444B-BABA-EB4995A82601}"/>
+              </a:ext>
+            </a:extLst>
+          </p:cNvPr>
+          <p:cNvPicPr>
+            <a:picLocks noChangeAspect="1"/>
+          </p:cNvPicPr>
+          <p:nvPr/>
+        </p:nvPicPr>
+        <p:blipFill>
+          <a:blip r:embed="rId4">
+            <a:extLst>
+              <a:ext uri="{28A0092B-C50C-407E-A947-70E740481C1C}">
+                <a14:useLocalDpi xmlns:a14="http://schemas.microsoft.com/office/drawing/2010/main" val="0"/>
+              </a:ext>
+            </a:extLst>
+          </a:blip>
+          <a:stretch>
+            <a:fillRect/>
+          </a:stretch>
+        </p:blipFill>
+        <p:spPr>
+          <a:xfrm>
+            <a:off x="5131307" y="2427293"/>
+            <a:ext cx="4778099" cy="6516635"/>
+          </a:xfrm>
+          <a:prstGeom prst="rect">
+            <a:avLst/>
+          </a:prstGeom>
+        </p:spPr>
+      </p:pic>
+      <p:sp>
+        <p:nvSpPr>
+          <p:cNvPr id="10" name="TextBox 9">
+            <a:extLst>
+              <a:ext uri="{FF2B5EF4-FFF2-40B4-BE49-F238E27FC236}">
+                <a16:creationId xmlns:a16="http://schemas.microsoft.com/office/drawing/2014/main" id="{97D190D2-B37A-4AD5-8E3E-4109EB49795D}"/>
+              </a:ext>
+            </a:extLst>
+          </p:cNvPr>
+          <p:cNvSpPr txBox="1"/>
+          <p:nvPr/>
+        </p:nvSpPr>
+        <p:spPr>
+          <a:xfrm>
+            <a:off x="983412" y="7796076"/>
+            <a:ext cx="3657600" cy="923330"/>
+          </a:xfrm>
+          <a:prstGeom prst="rect">
+            <a:avLst/>
+          </a:prstGeom>
+          <a:noFill/>
+        </p:spPr>
+        <p:txBody>
+          <a:bodyPr wrap="square" rtlCol="0">
+            <a:spAutoFit/>
+          </a:bodyPr>
+          <a:lstStyle/>
+          <a:p>
+            <a:r>
+              <a:rPr lang="en-US" dirty="0"/>
+              <a:t>Junit 5 and log4j and other dependencies for its proper running</a:t>
+            </a:r>
+          </a:p>
+        </p:txBody>
+      </p:sp>
+    </p:spTree>
+    <p:extLst>
+      <p:ext uri="{BB962C8B-B14F-4D97-AF65-F5344CB8AC3E}">
+        <p14:creationId xmlns:p14="http://schemas.microsoft.com/office/powerpoint/2010/main" val="837801718"/>
+      </p:ext>
+    </p:extLst>
+  </p:cSld>
+  <p:clrMapOvr>
+    <a:masterClrMapping/>
+  </p:clrMapOvr>
+  <p:transition spd="med"/>
+</p:sld>
+</file>
+
+<file path=ppt/slides/slide4.xml><?xml version="1.0" encoding="utf-8"?>
+<p:sld xmlns:a="http://schemas.openxmlformats.org/drawingml/2006/main" xmlns:r="http://schemas.openxmlformats.org/officeDocument/2006/relationships" xmlns:p="http://schemas.openxmlformats.org/presentationml/2006/main">
+  <p:cSld>
+    <p:spTree>
+      <p:nvGrpSpPr>
+        <p:cNvPr id="1" name=""/>
+        <p:cNvGrpSpPr/>
+        <p:nvPr/>
+      </p:nvGrpSpPr>
+      <p:grpSpPr>
+        <a:xfrm>
+          <a:off x="0" y="0"/>
+          <a:ext cx="0" cy="0"/>
+          <a:chOff x="0" y="0"/>
+          <a:chExt cx="0" cy="0"/>
+        </a:xfrm>
+      </p:grpSpPr>
+      <p:sp>
+        <p:nvSpPr>
+          <p:cNvPr id="129" name="System Sequence Diagram"/>
+          <p:cNvSpPr txBox="1">
+            <a:spLocks noGrp="1"/>
+          </p:cNvSpPr>
+          <p:nvPr>
+            <p:ph type="title"/>
+          </p:nvPr>
+        </p:nvSpPr>
+        <p:spPr>
+          <a:xfrm>
+            <a:off x="651329" y="486704"/>
+            <a:ext cx="7647282" cy="1044073"/>
+          </a:xfrm>
+          <a:prstGeom prst="rect">
+            <a:avLst/>
+          </a:prstGeom>
+        </p:spPr>
+        <p:txBody>
+          <a:bodyPr>
+            <a:normAutofit/>
+          </a:bodyPr>
+          <a:lstStyle>
+            <a:lvl1pPr defTabSz="502412">
+              <a:defRPr sz="6880"/>
+            </a:lvl1pPr>
+          </a:lstStyle>
+          <a:p>
+            <a:r>
+              <a:rPr lang="en-US" sz="6000" dirty="0"/>
+              <a:t>Git – Issues Handle</a:t>
+            </a:r>
+            <a:endParaRPr sz="6000" dirty="0"/>
+          </a:p>
+        </p:txBody>
+      </p:sp>
+      <p:pic>
+        <p:nvPicPr>
+          <p:cNvPr id="3" name="Picture 2">
+            <a:extLst>
+              <a:ext uri="{FF2B5EF4-FFF2-40B4-BE49-F238E27FC236}">
+                <a16:creationId xmlns:a16="http://schemas.microsoft.com/office/drawing/2014/main" id="{E3C3909D-301A-45D1-A7B3-B78262E4E2EA}"/>
+              </a:ext>
+            </a:extLst>
+          </p:cNvPr>
+          <p:cNvPicPr>
+            <a:picLocks noChangeAspect="1"/>
+          </p:cNvPicPr>
+          <p:nvPr/>
+        </p:nvPicPr>
+        <p:blipFill>
+          <a:blip r:embed="rId2">
+            <a:extLst>
+              <a:ext uri="{28A0092B-C50C-407E-A947-70E740481C1C}">
+                <a14:useLocalDpi xmlns:a14="http://schemas.microsoft.com/office/drawing/2010/main" val="0"/>
+              </a:ext>
+            </a:extLst>
+          </a:blip>
+          <a:stretch>
+            <a:fillRect/>
+          </a:stretch>
+        </p:blipFill>
+        <p:spPr>
+          <a:xfrm>
+            <a:off x="651329" y="1530777"/>
+            <a:ext cx="8981136" cy="7387187"/>
+          </a:xfrm>
+          <a:prstGeom prst="rect">
+            <a:avLst/>
+          </a:prstGeom>
+        </p:spPr>
+      </p:pic>
+    </p:spTree>
+    <p:extLst>
+      <p:ext uri="{BB962C8B-B14F-4D97-AF65-F5344CB8AC3E}">
+        <p14:creationId xmlns:p14="http://schemas.microsoft.com/office/powerpoint/2010/main" val="262725098"/>
+      </p:ext>
+    </p:extLst>
+  </p:cSld>
+  <p:clrMapOvr>
+    <a:masterClrMapping/>
+  </p:clrMapOvr>
+  <p:transition spd="med"/>
+</p:sld>
+</file>
+
+<file path=ppt/slides/slide5.xml><?xml version="1.0" encoding="utf-8"?>
+<p:sld xmlns:a="http://schemas.openxmlformats.org/drawingml/2006/main" xmlns:r="http://schemas.openxmlformats.org/officeDocument/2006/relationships" xmlns:p="http://schemas.openxmlformats.org/presentationml/2006/main">
+  <p:cSld>
+    <p:spTree>
+      <p:nvGrpSpPr>
+        <p:cNvPr id="1" name=""/>
+        <p:cNvGrpSpPr/>
+        <p:nvPr/>
+      </p:nvGrpSpPr>
+      <p:grpSpPr>
+        <a:xfrm>
+          <a:off x="0" y="0"/>
+          <a:ext cx="0" cy="0"/>
+          <a:chOff x="0" y="0"/>
+          <a:chExt cx="0" cy="0"/>
+        </a:xfrm>
+      </p:grpSpPr>
+      <p:sp>
+        <p:nvSpPr>
+          <p:cNvPr id="129" name="System Sequence Diagram"/>
+          <p:cNvSpPr txBox="1">
+            <a:spLocks noGrp="1"/>
+          </p:cNvSpPr>
+          <p:nvPr>
+            <p:ph type="title"/>
+          </p:nvPr>
+        </p:nvSpPr>
+        <p:spPr>
+          <a:xfrm>
+            <a:off x="651329" y="486704"/>
+            <a:ext cx="7647282" cy="1044073"/>
+          </a:xfrm>
+          <a:prstGeom prst="rect">
+            <a:avLst/>
+          </a:prstGeom>
+        </p:spPr>
+        <p:txBody>
+          <a:bodyPr>
+            <a:normAutofit/>
+          </a:bodyPr>
+          <a:lstStyle>
+            <a:lvl1pPr defTabSz="502412">
+              <a:defRPr sz="6880"/>
+            </a:lvl1pPr>
+          </a:lstStyle>
+          <a:p>
+            <a:r>
+              <a:rPr lang="en-US" sz="6000"/>
+              <a:t>Git – Commits</a:t>
+            </a:r>
+            <a:endParaRPr lang="en-US" sz="6000" dirty="0"/>
+          </a:p>
+        </p:txBody>
+      </p:sp>
+      <p:pic>
+        <p:nvPicPr>
+          <p:cNvPr id="4" name="Picture 3">
+            <a:extLst>
+              <a:ext uri="{FF2B5EF4-FFF2-40B4-BE49-F238E27FC236}">
+                <a16:creationId xmlns:a16="http://schemas.microsoft.com/office/drawing/2014/main" id="{FCA1BA5C-3295-4FDD-99C1-B23ECF8E3A58}"/>
+              </a:ext>
+            </a:extLst>
+          </p:cNvPr>
+          <p:cNvPicPr>
+            <a:picLocks noChangeAspect="1"/>
+          </p:cNvPicPr>
+          <p:nvPr/>
+        </p:nvPicPr>
+        <p:blipFill>
+          <a:blip r:embed="rId2">
+            <a:extLst>
+              <a:ext uri="{28A0092B-C50C-407E-A947-70E740481C1C}">
+                <a14:useLocalDpi xmlns:a14="http://schemas.microsoft.com/office/drawing/2010/main" val="0"/>
+              </a:ext>
+            </a:extLst>
+          </a:blip>
+          <a:stretch>
+            <a:fillRect/>
+          </a:stretch>
+        </p:blipFill>
+        <p:spPr>
+          <a:xfrm>
+            <a:off x="488542" y="1558169"/>
+            <a:ext cx="10018432" cy="6672380"/>
+          </a:xfrm>
+          <a:prstGeom prst="rect">
+            <a:avLst/>
+          </a:prstGeom>
+        </p:spPr>
+      </p:pic>
+      <p:sp>
+        <p:nvSpPr>
+          <p:cNvPr id="5" name="TextBox 4">
+            <a:extLst>
+              <a:ext uri="{FF2B5EF4-FFF2-40B4-BE49-F238E27FC236}">
+                <a16:creationId xmlns:a16="http://schemas.microsoft.com/office/drawing/2014/main" id="{93B70E2F-7ECF-4900-A805-CA2BB52E35AE}"/>
+              </a:ext>
+            </a:extLst>
+          </p:cNvPr>
+          <p:cNvSpPr txBox="1"/>
+          <p:nvPr/>
+        </p:nvSpPr>
+        <p:spPr>
+          <a:xfrm>
+            <a:off x="966158" y="8620565"/>
+            <a:ext cx="7460697" cy="707886"/>
+          </a:xfrm>
+          <a:prstGeom prst="rect">
+            <a:avLst/>
+          </a:prstGeom>
+          <a:noFill/>
+        </p:spPr>
+        <p:txBody>
+          <a:bodyPr wrap="none" rtlCol="0">
+            <a:spAutoFit/>
+          </a:bodyPr>
+          <a:lstStyle/>
+          <a:p>
+            <a:r>
+              <a:rPr lang="en-US" sz="2000" dirty="0"/>
+              <a:t>And there are so much more… Check our Repository at </a:t>
+            </a:r>
+          </a:p>
+          <a:p>
+            <a:r>
+              <a:rPr lang="en-US" sz="2000" dirty="0"/>
+              <a:t>https://bitbucket.org/csi-3471/csi-3471-software/src/master/</a:t>
+            </a:r>
+          </a:p>
+        </p:txBody>
+      </p:sp>
+    </p:spTree>
+    <p:extLst>
+      <p:ext uri="{BB962C8B-B14F-4D97-AF65-F5344CB8AC3E}">
+        <p14:creationId xmlns:p14="http://schemas.microsoft.com/office/powerpoint/2010/main" val="960404733"/>
+      </p:ext>
+    </p:extLst>
+  </p:cSld>
+  <p:clrMapOvr>
+    <a:masterClrMapping/>
+  </p:clrMapOvr>
+  <p:transition spd="med"/>
+</p:sld>
+</file>
+
+<file path=ppt/slides/slide6.xml><?xml version="1.0" encoding="utf-8"?>
+<p:sld xmlns:a="http://schemas.openxmlformats.org/drawingml/2006/main" xmlns:r="http://schemas.openxmlformats.org/officeDocument/2006/relationships" xmlns:p="http://schemas.openxmlformats.org/presentationml/2006/main">
+  <p:cSld>
+    <p:spTree>
+      <p:nvGrpSpPr>
+        <p:cNvPr id="1" name=""/>
+        <p:cNvGrpSpPr/>
+        <p:nvPr/>
+      </p:nvGrpSpPr>
+      <p:grpSpPr>
+        <a:xfrm>
+          <a:off x="0" y="0"/>
+          <a:ext cx="0" cy="0"/>
+          <a:chOff x="0" y="0"/>
+          <a:chExt cx="0" cy="0"/>
+        </a:xfrm>
+      </p:grpSpPr>
+      <p:sp>
+        <p:nvSpPr>
+          <p:cNvPr id="135" name="Domain Models"/>
+          <p:cNvSpPr txBox="1">
+            <a:spLocks noGrp="1"/>
+          </p:cNvSpPr>
+          <p:nvPr>
+            <p:ph type="title"/>
+          </p:nvPr>
+        </p:nvSpPr>
+        <p:spPr>
+          <a:xfrm>
+            <a:off x="1091560" y="1168278"/>
+            <a:ext cx="4155353" cy="949967"/>
+          </a:xfrm>
+          <a:prstGeom prst="rect">
+            <a:avLst/>
+          </a:prstGeom>
+        </p:spPr>
+        <p:txBody>
+          <a:bodyPr>
+            <a:noAutofit/>
+          </a:bodyPr>
+          <a:lstStyle/>
+          <a:p>
+            <a:r>
+              <a:rPr lang="en-US" sz="6000" dirty="0"/>
+              <a:t>GUI Design</a:t>
+            </a:r>
+            <a:endParaRPr sz="6000" dirty="0"/>
+          </a:p>
+        </p:txBody>
+      </p:sp>
+      <p:sp>
+        <p:nvSpPr>
+          <p:cNvPr id="2" name="TextBox 1">
+            <a:extLst>
+              <a:ext uri="{FF2B5EF4-FFF2-40B4-BE49-F238E27FC236}">
+                <a16:creationId xmlns:a16="http://schemas.microsoft.com/office/drawing/2014/main" id="{4D28E2B7-A510-4A60-8538-0BBBFC3DD220}"/>
+              </a:ext>
+            </a:extLst>
+          </p:cNvPr>
+          <p:cNvSpPr txBox="1"/>
+          <p:nvPr/>
+        </p:nvSpPr>
+        <p:spPr>
+          <a:xfrm>
+            <a:off x="1091561" y="2834041"/>
+            <a:ext cx="9489353" cy="4801314"/>
+          </a:xfrm>
+          <a:prstGeom prst="rect">
+            <a:avLst/>
+          </a:prstGeom>
+          <a:noFill/>
+        </p:spPr>
+        <p:txBody>
+          <a:bodyPr wrap="square" rtlCol="0">
+            <a:spAutoFit/>
+          </a:bodyPr>
+          <a:lstStyle/>
+          <a:p>
+            <a:r>
+              <a:rPr lang="en-US" sz="3200" dirty="0"/>
+              <a:t>The User Interface is first thing user will see when using our software, so a beautiful UI will make our customer very happy and glad to pay us (credits). We use NetBeans IDE for GUI development, it has a unique GUI builder function, which help developer organize different GUI easily, and also design preview makes product more predictable. All this will for sure give our customer a best using experience.</a:t>
+            </a:r>
+          </a:p>
+          <a:p>
+            <a:endParaRPr lang="en-US" dirty="0"/>
+          </a:p>
+        </p:txBody>
+      </p:sp>
+      <p:pic>
+        <p:nvPicPr>
+          <p:cNvPr id="5" name="Picture 4">
+            <a:extLst>
+              <a:ext uri="{FF2B5EF4-FFF2-40B4-BE49-F238E27FC236}">
+                <a16:creationId xmlns:a16="http://schemas.microsoft.com/office/drawing/2014/main" id="{4E89BAFA-4965-4BED-A8D9-475B3F54D8FA}"/>
+              </a:ext>
+            </a:extLst>
+          </p:cNvPr>
+          <p:cNvPicPr>
+            <a:picLocks noChangeAspect="1"/>
+          </p:cNvPicPr>
+          <p:nvPr/>
+        </p:nvPicPr>
+        <p:blipFill>
+          <a:blip r:embed="rId2">
+            <a:extLst>
+              <a:ext uri="{28A0092B-C50C-407E-A947-70E740481C1C}">
+                <a14:useLocalDpi xmlns:a14="http://schemas.microsoft.com/office/drawing/2010/main" val="0"/>
+              </a:ext>
+            </a:extLst>
+          </a:blip>
+          <a:stretch>
+            <a:fillRect/>
+          </a:stretch>
+        </p:blipFill>
+        <p:spPr>
+          <a:xfrm>
+            <a:off x="0" y="2118245"/>
+            <a:ext cx="13004800" cy="5787218"/>
+          </a:xfrm>
+          <a:prstGeom prst="rect">
+            <a:avLst/>
+          </a:prstGeom>
+        </p:spPr>
+      </p:pic>
+    </p:spTree>
+    <p:extLst>
+      <p:ext uri="{BB962C8B-B14F-4D97-AF65-F5344CB8AC3E}">
+        <p14:creationId xmlns:p14="http://schemas.microsoft.com/office/powerpoint/2010/main" val="495087382"/>
+      </p:ext>
+    </p:extLst>
+  </p:cSld>
+  <p:clrMapOvr>
+    <a:masterClrMapping/>
+  </p:clrMapOvr>
+  <p:transition spd="med"/>
+  <p:timing>
+    <p:tnLst>
+      <p:par>
+        <p:cTn id="1" dur="indefinite" restart="never" nodeType="tmRoot">
+          <p:childTnLst>
+            <p:seq concurrent="1" nextAc="seek">
+              <p:cTn id="2" dur="indefinite" nodeType="mainSeq">
+                <p:childTnLst>
+                  <p:par>
+                    <p:cTn id="3" fill="hold">
+                      <p:stCondLst>
+                        <p:cond delay="indefinite"/>
+                      </p:stCondLst>
+                      <p:childTnLst>
+                        <p:par>
+                          <p:cTn id="4" fill="hold">
+                            <p:stCondLst>
+                              <p:cond delay="0"/>
+                            </p:stCondLst>
+                            <p:childTnLst>
+                              <p:par>
+                                <p:cTn id="5" presetID="2" presetClass="entr" presetSubtype="4" fill="hold" nodeType="clickEffect">
+                                  <p:stCondLst>
+                                    <p:cond delay="0"/>
+                                  </p:stCondLst>
+                                  <p:childTnLst>
+                                    <p:set>
+                                      <p:cBhvr>
+                                        <p:cTn id="6" dur="1" fill="hold">
+                                          <p:stCondLst>
+                                            <p:cond delay="0"/>
+                                          </p:stCondLst>
+                                        </p:cTn>
+                                        <p:tgtEl>
+                                          <p:spTgt spid="5"/>
+                                        </p:tgtEl>
+                                        <p:attrNameLst>
+                                          <p:attrName>style.visibility</p:attrName>
+                                        </p:attrNameLst>
+                                      </p:cBhvr>
+                                      <p:to>
+                                        <p:strVal val="visible"/>
+                                      </p:to>
+                                    </p:set>
+                                    <p:anim calcmode="lin" valueType="num">
+                                      <p:cBhvr additive="base">
+                                        <p:cTn id="7" dur="500" fill="hold"/>
+                                        <p:tgtEl>
+                                          <p:spTgt spid="5"/>
+                                        </p:tgtEl>
+                                        <p:attrNameLst>
+                                          <p:attrName>ppt_x</p:attrName>
+                                        </p:attrNameLst>
+                                      </p:cBhvr>
+                                      <p:tavLst>
+                                        <p:tav tm="0">
+                                          <p:val>
+                                            <p:strVal val="#ppt_x"/>
+                                          </p:val>
+                                        </p:tav>
+                                        <p:tav tm="100000">
+                                          <p:val>
+                                            <p:strVal val="#ppt_x"/>
+                                          </p:val>
+                                        </p:tav>
+                                      </p:tavLst>
+                                    </p:anim>
+                                    <p:anim calcmode="lin" valueType="num">
+                                      <p:cBhvr additive="base">
+                                        <p:cTn id="8" dur="500" fill="hold"/>
+                                        <p:tgtEl>
+                                          <p:spTgt spid="5"/>
+                                        </p:tgtEl>
+                                        <p:attrNameLst>
+                                          <p:attrName>ppt_y</p:attrName>
+                                        </p:attrNameLst>
+                                      </p:cBhvr>
+                                      <p:tavLst>
+                                        <p:tav tm="0">
+                                          <p:val>
+                                            <p:strVal val="1+#ppt_h/2"/>
+                                          </p:val>
+                                        </p:tav>
+                                        <p:tav tm="100000">
+                                          <p:val>
+                                            <p:strVal val="#ppt_y"/>
+                                          </p:val>
+                                        </p:tav>
+                                      </p:tavLst>
+                                    </p:anim>
+                                  </p:childTnLst>
+                                </p:cTn>
+                              </p:par>
+                            </p:childTnLst>
+                          </p:cTn>
+                        </p:par>
+                      </p:childTnLst>
+                    </p:cTn>
+                  </p:par>
+                </p:childTnLst>
+              </p:cTn>
+              <p:prevCondLst>
+                <p:cond evt="onPrev" delay="0">
+                  <p:tgtEl>
+                    <p:sldTgt/>
+                  </p:tgtEl>
+                </p:cond>
+              </p:prevCondLst>
+              <p:nextCondLst>
+                <p:cond evt="onNext" delay="0">
+                  <p:tgtEl>
+                    <p:sldTgt/>
+                  </p:tgtEl>
+                </p:cond>
+              </p:nextCondLst>
+            </p:seq>
+          </p:childTnLst>
+        </p:cTn>
+      </p:par>
+    </p:tnLst>
+  </p:timing>
+</p:sld>
+</file>
+
+<file path=ppt/slides/slide7.xml><?xml version="1.0" encoding="utf-8"?>
+<p:sld xmlns:a="http://schemas.openxmlformats.org/drawingml/2006/main" xmlns:r="http://schemas.openxmlformats.org/officeDocument/2006/relationships" xmlns:p="http://schemas.openxmlformats.org/presentationml/2006/main">
+  <p:cSld>
+    <p:spTree>
+      <p:nvGrpSpPr>
+        <p:cNvPr id="1" name=""/>
+        <p:cNvGrpSpPr/>
+        <p:nvPr/>
+      </p:nvGrpSpPr>
+      <p:grpSpPr>
+        <a:xfrm>
+          <a:off x="0" y="0"/>
+          <a:ext cx="0" cy="0"/>
+          <a:chOff x="0" y="0"/>
+          <a:chExt cx="0" cy="0"/>
+        </a:xfrm>
+      </p:grpSpPr>
+      <p:sp>
+        <p:nvSpPr>
+          <p:cNvPr id="135" name="Domain Models"/>
+          <p:cNvSpPr txBox="1">
+            <a:spLocks noGrp="1"/>
+          </p:cNvSpPr>
+          <p:nvPr>
+            <p:ph type="title"/>
+          </p:nvPr>
+        </p:nvSpPr>
+        <p:spPr>
+          <a:xfrm>
+            <a:off x="1123451" y="1188194"/>
+            <a:ext cx="2922816" cy="949967"/>
+          </a:xfrm>
+          <a:prstGeom prst="rect">
+            <a:avLst/>
+          </a:prstGeom>
+        </p:spPr>
+        <p:txBody>
+          <a:bodyPr>
+            <a:noAutofit/>
+          </a:bodyPr>
+          <a:lstStyle/>
+          <a:p>
+            <a:r>
+              <a:rPr lang="en-US" sz="6000" dirty="0"/>
+              <a:t>Testing</a:t>
+            </a:r>
+            <a:endParaRPr sz="6000" dirty="0"/>
+          </a:p>
+        </p:txBody>
+      </p:sp>
+      <p:pic>
+        <p:nvPicPr>
+          <p:cNvPr id="4" name="Picture 3">
+            <a:extLst>
+              <a:ext uri="{FF2B5EF4-FFF2-40B4-BE49-F238E27FC236}">
+                <a16:creationId xmlns:a16="http://schemas.microsoft.com/office/drawing/2014/main" id="{14322646-E501-4A91-8891-0D1599D58BDC}"/>
+              </a:ext>
+            </a:extLst>
+          </p:cNvPr>
+          <p:cNvPicPr>
+            <a:picLocks noChangeAspect="1"/>
+          </p:cNvPicPr>
+          <p:nvPr/>
+        </p:nvPicPr>
+        <p:blipFill>
+          <a:blip r:embed="rId2">
+            <a:extLst>
+              <a:ext uri="{28A0092B-C50C-407E-A947-70E740481C1C}">
+                <a14:useLocalDpi xmlns:a14="http://schemas.microsoft.com/office/drawing/2010/main" val="0"/>
+              </a:ext>
+            </a:extLst>
+          </a:blip>
+          <a:stretch>
+            <a:fillRect/>
+          </a:stretch>
+        </p:blipFill>
+        <p:spPr>
+          <a:xfrm>
+            <a:off x="1532169" y="5738310"/>
+            <a:ext cx="3082471" cy="3082471"/>
+          </a:xfrm>
+          <a:prstGeom prst="rect">
+            <a:avLst/>
+          </a:prstGeom>
+        </p:spPr>
+      </p:pic>
+      <p:sp>
+        <p:nvSpPr>
+          <p:cNvPr id="2" name="TextBox 1">
+            <a:extLst>
+              <a:ext uri="{FF2B5EF4-FFF2-40B4-BE49-F238E27FC236}">
+                <a16:creationId xmlns:a16="http://schemas.microsoft.com/office/drawing/2014/main" id="{4D28E2B7-A510-4A60-8538-0BBBFC3DD220}"/>
+              </a:ext>
+            </a:extLst>
+          </p:cNvPr>
+          <p:cNvSpPr txBox="1"/>
+          <p:nvPr/>
+        </p:nvSpPr>
+        <p:spPr>
+          <a:xfrm>
+            <a:off x="1123451" y="2845739"/>
+            <a:ext cx="8555388" cy="2339102"/>
+          </a:xfrm>
+          <a:prstGeom prst="rect">
+            <a:avLst/>
+          </a:prstGeom>
+          <a:noFill/>
+        </p:spPr>
+        <p:txBody>
+          <a:bodyPr wrap="square" rtlCol="0">
+            <a:spAutoFit/>
+          </a:bodyPr>
+          <a:lstStyle/>
+          <a:p>
+            <a:r>
+              <a:rPr lang="en-US" sz="3200" dirty="0"/>
+              <a:t>We thoroughly test the model’s API, the collection of objects, the controller and the access of database, creating, inserting, updating and delete data from database. </a:t>
+            </a:r>
+          </a:p>
+          <a:p>
+            <a:endParaRPr lang="en-US" dirty="0"/>
+          </a:p>
+        </p:txBody>
+      </p:sp>
+      <p:pic>
+        <p:nvPicPr>
+          <p:cNvPr id="5" name="Picture 4">
+            <a:extLst>
+              <a:ext uri="{FF2B5EF4-FFF2-40B4-BE49-F238E27FC236}">
+                <a16:creationId xmlns:a16="http://schemas.microsoft.com/office/drawing/2014/main" id="{DFA4013C-55EC-4C05-88CA-FCD7B66EECDC}"/>
+              </a:ext>
+            </a:extLst>
+          </p:cNvPr>
+          <p:cNvPicPr>
+            <a:picLocks noChangeAspect="1"/>
+          </p:cNvPicPr>
+          <p:nvPr/>
+        </p:nvPicPr>
+        <p:blipFill>
+          <a:blip r:embed="rId3">
+            <a:extLst>
+              <a:ext uri="{28A0092B-C50C-407E-A947-70E740481C1C}">
+                <a14:useLocalDpi xmlns:a14="http://schemas.microsoft.com/office/drawing/2010/main" val="0"/>
+              </a:ext>
+            </a:extLst>
+          </a:blip>
+          <a:stretch>
+            <a:fillRect/>
+          </a:stretch>
+        </p:blipFill>
+        <p:spPr>
+          <a:xfrm>
+            <a:off x="5231459" y="5605661"/>
+            <a:ext cx="3830561" cy="3830561"/>
+          </a:xfrm>
+          <a:prstGeom prst="rect">
+            <a:avLst/>
+          </a:prstGeom>
+        </p:spPr>
+      </p:pic>
+    </p:spTree>
+  </p:cSld>
+  <p:clrMapOvr>
+    <a:masterClrMapping/>
+  </p:clrMapOvr>
+  <p:transition spd="med"/>
+</p:sld>
+</file>
+
+<file path=ppt/slides/slide8.xml><?xml version="1.0" encoding="utf-8"?>
+<p:sld xmlns:a="http://schemas.openxmlformats.org/drawingml/2006/main" xmlns:r="http://schemas.openxmlformats.org/officeDocument/2006/relationships" xmlns:p="http://schemas.openxmlformats.org/presentationml/2006/main">
+  <p:cSld>
+    <p:spTree>
+      <p:nvGrpSpPr>
+        <p:cNvPr id="1" name=""/>
+        <p:cNvGrpSpPr/>
+        <p:nvPr/>
+      </p:nvGrpSpPr>
+      <p:grpSpPr>
+        <a:xfrm>
+          <a:off x="0" y="0"/>
+          <a:ext cx="0" cy="0"/>
+          <a:chOff x="0" y="0"/>
+          <a:chExt cx="0" cy="0"/>
+        </a:xfrm>
+      </p:grpSpPr>
+      <p:sp>
+        <p:nvSpPr>
+          <p:cNvPr id="135" name="Domain Models"/>
+          <p:cNvSpPr txBox="1">
+            <a:spLocks noGrp="1"/>
+          </p:cNvSpPr>
+          <p:nvPr>
+            <p:ph type="title"/>
+          </p:nvPr>
+        </p:nvSpPr>
+        <p:spPr>
+          <a:xfrm>
+            <a:off x="3278093" y="1985188"/>
+            <a:ext cx="5635811" cy="949967"/>
+          </a:xfrm>
+          <a:prstGeom prst="rect">
+            <a:avLst/>
+          </a:prstGeom>
+        </p:spPr>
+        <p:txBody>
+          <a:bodyPr>
+            <a:noAutofit/>
+          </a:bodyPr>
+          <a:lstStyle/>
+          <a:p>
+            <a:r>
+              <a:rPr lang="en-US" sz="6000" dirty="0"/>
+              <a:t>UML Diagrams</a:t>
+            </a:r>
+            <a:endParaRPr sz="6000" dirty="0"/>
+          </a:p>
+        </p:txBody>
+      </p:sp>
+      <p:sp>
+        <p:nvSpPr>
+          <p:cNvPr id="3" name="TextBox 2">
+            <a:extLst>
+              <a:ext uri="{FF2B5EF4-FFF2-40B4-BE49-F238E27FC236}">
+                <a16:creationId xmlns:a16="http://schemas.microsoft.com/office/drawing/2014/main" id="{127CECB1-F551-45A1-BC55-07AEB84F7149}"/>
+              </a:ext>
+            </a:extLst>
+          </p:cNvPr>
+          <p:cNvSpPr txBox="1"/>
+          <p:nvPr/>
+        </p:nvSpPr>
+        <p:spPr>
+          <a:xfrm>
+            <a:off x="2710541" y="4276635"/>
+            <a:ext cx="6770914" cy="1200329"/>
+          </a:xfrm>
+          <a:prstGeom prst="rect">
+            <a:avLst/>
+          </a:prstGeom>
+          <a:noFill/>
+        </p:spPr>
+        <p:txBody>
+          <a:bodyPr wrap="square" rtlCol="0">
+            <a:spAutoFit/>
+          </a:bodyPr>
+          <a:lstStyle/>
+          <a:p>
+            <a:r>
+              <a:rPr lang="en-US" sz="2400" dirty="0"/>
+              <a:t>For demonstration, here we have </a:t>
+            </a:r>
+            <a:r>
+              <a:rPr lang="en-US" sz="2400" dirty="0">
+                <a:solidFill>
+                  <a:srgbClr val="FF0000"/>
+                </a:solidFill>
+              </a:rPr>
+              <a:t>Domain Model Diagram </a:t>
+            </a:r>
+            <a:r>
+              <a:rPr lang="en-US" sz="2400" dirty="0"/>
+              <a:t>and </a:t>
+            </a:r>
+            <a:r>
+              <a:rPr lang="en-US" sz="2400" dirty="0">
+                <a:solidFill>
+                  <a:srgbClr val="FF0000"/>
+                </a:solidFill>
+              </a:rPr>
+              <a:t>Class Diagram</a:t>
+            </a:r>
+            <a:r>
+              <a:rPr lang="en-US" sz="2400" dirty="0"/>
+              <a:t>, they can show our software structure better…</a:t>
+            </a:r>
+          </a:p>
+        </p:txBody>
+      </p:sp>
+    </p:spTree>
+    <p:extLst>
+      <p:ext uri="{BB962C8B-B14F-4D97-AF65-F5344CB8AC3E}">
+        <p14:creationId xmlns:p14="http://schemas.microsoft.com/office/powerpoint/2010/main" val="3524579691"/>
+      </p:ext>
+    </p:extLst>
+  </p:cSld>
+  <p:clrMapOvr>
+    <a:masterClrMapping/>
+  </p:clrMapOvr>
+  <p:transition spd="med"/>
+</p:sld>
+</file>
+
+<file path=ppt/slides/slide9.xml><?xml version="1.0" encoding="utf-8"?>
+<p:sld xmlns:a="http://schemas.openxmlformats.org/drawingml/2006/main" xmlns:r="http://schemas.openxmlformats.org/officeDocument/2006/relationships" xmlns:p="http://schemas.openxmlformats.org/presentationml/2006/main">
+  <p:cSld>
+    <p:bg>
+      <p:bgPr>
+        <a:solidFill>
+          <a:schemeClr val="bg1"/>
+        </a:solidFill>
+        <a:effectLst/>
+      </p:bgPr>
+    </p:bg>
+    <p:spTree>
+      <p:nvGrpSpPr>
+        <p:cNvPr id="1" name=""/>
+        <p:cNvGrpSpPr/>
+        <p:nvPr/>
+      </p:nvGrpSpPr>
+      <p:grpSpPr>
+        <a:xfrm>
+          <a:off x="0" y="0"/>
+          <a:ext cx="0" cy="0"/>
+          <a:chOff x="0" y="0"/>
+          <a:chExt cx="0" cy="0"/>
+        </a:xfrm>
+      </p:grpSpPr>
       <p:grpSp>
         <p:nvGrpSpPr>
-          <p:cNvPr id="115" name="Group 114">
+          <p:cNvPr id="146" name="Group 145">
             <a:extLst>
               <a:ext uri="{FF2B5EF4-FFF2-40B4-BE49-F238E27FC236}">
-                <a16:creationId xmlns:a16="http://schemas.microsoft.com/office/drawing/2014/main" id="{CEEA9366-CEA8-4F23-B065-4337F0D836FE}"/>
+                <a16:creationId xmlns:a16="http://schemas.microsoft.com/office/drawing/2014/main" id="{90A61547-2555-4DE2-A37F-A53E54917441}"/>
               </a:ext>
               <a:ext uri="{C183D7F6-B498-43B3-948B-1728B52AA6E4}">
                 <adec:decorative xmlns:adec="http://schemas.microsoft.com/office/drawing/2017/decorative" val="1"/>
@@ -7842,10 +9898,10 @@
         </p:grpSpPr>
         <p:cxnSp>
           <p:nvCxnSpPr>
-            <p:cNvPr id="116" name="Straight Connector 115">
+            <p:cNvPr id="147" name="Straight Connector 146">
               <a:extLst>
                 <a:ext uri="{FF2B5EF4-FFF2-40B4-BE49-F238E27FC236}">
-                  <a16:creationId xmlns:a16="http://schemas.microsoft.com/office/drawing/2014/main" id="{904A03D6-39B4-4278-9BE1-A07E024499BE}"/>
+                  <a16:creationId xmlns:a16="http://schemas.microsoft.com/office/drawing/2014/main" id="{5C2447E0-8F0D-479C-94E4-82BC8EB68C0C}"/>
                 </a:ext>
                 <a:ext uri="{C183D7F6-B498-43B3-948B-1728B52AA6E4}">
                   <adec:decorative xmlns:adec="http://schemas.microsoft.com/office/drawing/2017/decorative" val="1"/>
@@ -7871,7 +9927,9 @@
             </a:prstGeom>
             <a:ln w="9525">
               <a:solidFill>
-                <a:srgbClr val="FFFFFF"/>
+                <a:schemeClr val="bg1">
+                  <a:lumMod val="75000"/>
+                </a:schemeClr>
               </a:solidFill>
             </a:ln>
           </p:spPr>
@@ -7892,10 +9950,10 @@
         </p:cxnSp>
         <p:cxnSp>
           <p:nvCxnSpPr>
-            <p:cNvPr id="117" name="Straight Connector 116">
+            <p:cNvPr id="148" name="Straight Connector 147">
               <a:extLst>
                 <a:ext uri="{FF2B5EF4-FFF2-40B4-BE49-F238E27FC236}">
-                  <a16:creationId xmlns:a16="http://schemas.microsoft.com/office/drawing/2014/main" id="{FBE459AF-3736-4886-82E0-9B5DA427B5E0}"/>
+                  <a16:creationId xmlns:a16="http://schemas.microsoft.com/office/drawing/2014/main" id="{1F943397-DCDD-44CB-BBA9-9510B7698DD2}"/>
                 </a:ext>
                 <a:ext uri="{C183D7F6-B498-43B3-948B-1728B52AA6E4}">
                   <adec:decorative xmlns:adec="http://schemas.microsoft.com/office/drawing/2017/decorative" val="1"/>
@@ -7922,7 +9980,7 @@
             <a:ln w="9525">
               <a:solidFill>
                 <a:schemeClr val="bg1">
-                  <a:alpha val="80000"/>
+                  <a:lumMod val="85000"/>
                 </a:schemeClr>
               </a:solidFill>
             </a:ln>
@@ -7944,10 +10002,10 @@
         </p:cxnSp>
         <p:sp>
           <p:nvSpPr>
-            <p:cNvPr id="118" name="Rectangle 23">
+            <p:cNvPr id="149" name="Rectangle 23">
               <a:extLst>
                 <a:ext uri="{FF2B5EF4-FFF2-40B4-BE49-F238E27FC236}">
-                  <a16:creationId xmlns:a16="http://schemas.microsoft.com/office/drawing/2014/main" id="{4B6B88EF-180C-4E39-8A3F-A52E87110C66}"/>
+                  <a16:creationId xmlns:a16="http://schemas.microsoft.com/office/drawing/2014/main" id="{E2630ADC-31DB-4C48-AC4A-DAAE5A7B8EA6}"/>
                 </a:ext>
                 <a:ext uri="{C183D7F6-B498-43B3-948B-1728B52AA6E4}">
                   <adec:decorative xmlns:adec="http://schemas.microsoft.com/office/drawing/2017/decorative" val="1"/>
@@ -8022,10 +10080,10 @@
         </p:sp>
         <p:sp>
           <p:nvSpPr>
-            <p:cNvPr id="119" name="Rectangle 25">
+            <p:cNvPr id="150" name="Rectangle 25">
               <a:extLst>
                 <a:ext uri="{FF2B5EF4-FFF2-40B4-BE49-F238E27FC236}">
-                  <a16:creationId xmlns:a16="http://schemas.microsoft.com/office/drawing/2014/main" id="{52DFAACF-64D0-4621-8FF4-E2F03C3E8D15}"/>
+                  <a16:creationId xmlns:a16="http://schemas.microsoft.com/office/drawing/2014/main" id="{2CA5C44E-F54E-47E0-8989-4D8686B33C80}"/>
                 </a:ext>
                 <a:ext uri="{C183D7F6-B498-43B3-948B-1728B52AA6E4}">
                   <adec:decorative xmlns:adec="http://schemas.microsoft.com/office/drawing/2017/decorative" val="1"/>
@@ -8100,10 +10158,10 @@
         </p:sp>
         <p:sp>
           <p:nvSpPr>
-            <p:cNvPr id="120" name="Isosceles Triangle 119">
+            <p:cNvPr id="151" name="Isosceles Triangle 150">
               <a:extLst>
                 <a:ext uri="{FF2B5EF4-FFF2-40B4-BE49-F238E27FC236}">
-                  <a16:creationId xmlns:a16="http://schemas.microsoft.com/office/drawing/2014/main" id="{36611FF0-65B3-49DB-97C6-1B72AAD0FB02}"/>
+                  <a16:creationId xmlns:a16="http://schemas.microsoft.com/office/drawing/2014/main" id="{FF54E15E-830B-4375-A239-4C51954DEAEC}"/>
                 </a:ext>
                 <a:ext uri="{C183D7F6-B498-43B3-948B-1728B52AA6E4}">
                   <adec:decorative xmlns:adec="http://schemas.microsoft.com/office/drawing/2017/decorative" val="1"/>
@@ -8156,10 +10214,10 @@
         </p:sp>
         <p:sp>
           <p:nvSpPr>
-            <p:cNvPr id="121" name="Rectangle 27">
+            <p:cNvPr id="152" name="Rectangle 27">
               <a:extLst>
                 <a:ext uri="{FF2B5EF4-FFF2-40B4-BE49-F238E27FC236}">
-                  <a16:creationId xmlns:a16="http://schemas.microsoft.com/office/drawing/2014/main" id="{0F7407FE-86B1-4890-9D80-9406FBF29E46}"/>
+                  <a16:creationId xmlns:a16="http://schemas.microsoft.com/office/drawing/2014/main" id="{CB37E322-FF7E-4872-BD6B-50A48CBEA5CE}"/>
                 </a:ext>
                 <a:ext uri="{C183D7F6-B498-43B3-948B-1728B52AA6E4}">
                   <adec:decorative xmlns:adec="http://schemas.microsoft.com/office/drawing/2017/decorative" val="1"/>
@@ -8235,10 +10293,90 @@
         </p:sp>
         <p:sp>
           <p:nvSpPr>
-            <p:cNvPr id="122" name="Rectangle 29">
+            <p:cNvPr id="153" name="Rectangle 28">
               <a:extLst>
                 <a:ext uri="{FF2B5EF4-FFF2-40B4-BE49-F238E27FC236}">
-                  <a16:creationId xmlns:a16="http://schemas.microsoft.com/office/drawing/2014/main" id="{EBD42D5B-8F87-45B3-98B3-C66944F92E65}"/>
+                  <a16:creationId xmlns:a16="http://schemas.microsoft.com/office/drawing/2014/main" id="{710D0C1E-D2F8-45B2-AE14-1AC8E976F7A2}"/>
+                </a:ext>
+                <a:ext uri="{C183D7F6-B498-43B3-948B-1728B52AA6E4}">
+                  <adec:decorative xmlns:adec="http://schemas.microsoft.com/office/drawing/2017/decorative" val="1"/>
+                </a:ext>
+              </a:extLst>
+            </p:cNvPr>
+            <p:cNvSpPr/>
+            <p:nvPr>
+              <p:extLst>
+                <p:ext uri="{386F3935-93C4-4BCD-93E2-E3B085C9AB24}">
+                  <p16:designElem xmlns:p16="http://schemas.microsoft.com/office/powerpoint/2015/main" val="1"/>
+                </p:ext>
+              </p:extLst>
+            </p:nvPr>
+          </p:nvSpPr>
+          <p:spPr>
+            <a:xfrm>
+              <a:off x="10898730" y="-8467"/>
+              <a:ext cx="1290094" cy="6866467"/>
+            </a:xfrm>
+            <a:custGeom>
+              <a:avLst/>
+              <a:gdLst/>
+              <a:ahLst/>
+              <a:cxnLst/>
+              <a:rect l="l" t="t" r="r" b="b"/>
+              <a:pathLst>
+                <a:path w="1290094" h="6858000">
+                  <a:moveTo>
+                    <a:pt x="1019735" y="0"/>
+                  </a:moveTo>
+                  <a:lnTo>
+                    <a:pt x="1290094" y="0"/>
+                  </a:lnTo>
+                  <a:lnTo>
+                    <a:pt x="1290094" y="6858000"/>
+                  </a:lnTo>
+                  <a:lnTo>
+                    <a:pt x="0" y="6858000"/>
+                  </a:lnTo>
+                  <a:lnTo>
+                    <a:pt x="1019735" y="0"/>
+                  </a:lnTo>
+                  <a:close/>
+                </a:path>
+              </a:pathLst>
+            </a:custGeom>
+            <a:solidFill>
+              <a:schemeClr val="accent1">
+                <a:lumMod val="60000"/>
+                <a:lumOff val="40000"/>
+                <a:alpha val="70000"/>
+              </a:schemeClr>
+            </a:solidFill>
+            <a:ln>
+              <a:noFill/>
+            </a:ln>
+            <a:effectLst/>
+          </p:spPr>
+          <p:style>
+            <a:lnRef idx="1">
+              <a:schemeClr val="accent1"/>
+            </a:lnRef>
+            <a:fillRef idx="3">
+              <a:schemeClr val="accent1"/>
+            </a:fillRef>
+            <a:effectRef idx="2">
+              <a:schemeClr val="accent1"/>
+            </a:effectRef>
+            <a:fontRef idx="minor">
+              <a:schemeClr val="lt1"/>
+            </a:fontRef>
+          </p:style>
+        </p:sp>
+        <p:sp>
+          <p:nvSpPr>
+            <p:cNvPr id="154" name="Rectangle 29">
+              <a:extLst>
+                <a:ext uri="{FF2B5EF4-FFF2-40B4-BE49-F238E27FC236}">
+                  <a16:creationId xmlns:a16="http://schemas.microsoft.com/office/drawing/2014/main" id="{3216331B-17D0-4167-ABD2-B2198058C2D2}"/>
                 </a:ext>
                 <a:ext uri="{C183D7F6-B498-43B3-948B-1728B52AA6E4}">
                   <adec:decorative xmlns:adec="http://schemas.microsoft.com/office/drawing/2017/decorative" val="1"/>
@@ -8313,10 +10451,10 @@
         </p:sp>
         <p:sp>
           <p:nvSpPr>
-            <p:cNvPr id="123" name="Isosceles Triangle 122">
+            <p:cNvPr id="155" name="Isosceles Triangle 154">
               <a:extLst>
                 <a:ext uri="{FF2B5EF4-FFF2-40B4-BE49-F238E27FC236}">
-                  <a16:creationId xmlns:a16="http://schemas.microsoft.com/office/drawing/2014/main" id="{F5E04699-59E1-4468-9E7C-83070EEB4204}"/>
+                  <a16:creationId xmlns:a16="http://schemas.microsoft.com/office/drawing/2014/main" id="{A53A7A96-3806-4BB3-91DE-6EED48AC787E}"/>
                 </a:ext>
                 <a:ext uri="{C183D7F6-B498-43B3-948B-1728B52AA6E4}">
                   <adec:decorative xmlns:adec="http://schemas.microsoft.com/office/drawing/2017/decorative" val="1"/>
@@ -8369,10 +10507,10 @@
         </p:sp>
         <p:sp>
           <p:nvSpPr>
-            <p:cNvPr id="124" name="Isosceles Triangle 123">
+            <p:cNvPr id="156" name="Isosceles Triangle 155">
               <a:extLst>
                 <a:ext uri="{FF2B5EF4-FFF2-40B4-BE49-F238E27FC236}">
-                  <a16:creationId xmlns:a16="http://schemas.microsoft.com/office/drawing/2014/main" id="{F2AE8F13-9A52-4D7F-9637-321EA7CF3212}"/>
+                  <a16:creationId xmlns:a16="http://schemas.microsoft.com/office/drawing/2014/main" id="{F8C2B86C-EE71-466E-8991-503F9C9C1B22}"/>
                 </a:ext>
                 <a:ext uri="{C183D7F6-B498-43B3-948B-1728B52AA6E4}">
                   <adec:decorative xmlns:adec="http://schemas.microsoft.com/office/drawing/2017/decorative" val="1"/>
@@ -8424,110 +10562,12 @@
           </p:style>
         </p:sp>
       </p:grpSp>
-    </p:spTree>
-  </p:cSld>
-  <p:clrMapOvr>
-    <a:overrideClrMapping bg1="dk1" tx1="lt1" bg2="dk2" tx2="lt2" accent1="accent1" accent2="accent2" accent3="accent3" accent4="accent4" accent5="accent5" accent6="accent6" hlink="hlink" folHlink="folHlink"/>
-  </p:clrMapOvr>
-  <p:transition spd="med"/>
-</p:sld>
-</file>
-
-<file path=ppt/slides/slide2.xml><?xml version="1.0" encoding="utf-8"?>
-<p:sld xmlns:a="http://schemas.openxmlformats.org/drawingml/2006/main" xmlns:r="http://schemas.openxmlformats.org/officeDocument/2006/relationships" xmlns:p="http://schemas.openxmlformats.org/presentationml/2006/main">
-  <p:cSld>
-    <p:spTree>
-      <p:nvGrpSpPr>
-        <p:cNvPr id="1" name=""/>
-        <p:cNvGrpSpPr/>
-        <p:nvPr/>
-      </p:nvGrpSpPr>
-      <p:grpSpPr>
-        <a:xfrm>
-          <a:off x="0" y="0"/>
-          <a:ext cx="0" cy="0"/>
-          <a:chOff x="0" y="0"/>
-          <a:chExt cx="0" cy="0"/>
-        </a:xfrm>
-      </p:grpSpPr>
-      <p:sp>
-        <p:nvSpPr>
-          <p:cNvPr id="129" name="System Sequence Diagram"/>
-          <p:cNvSpPr txBox="1">
-            <a:spLocks noGrp="1"/>
-          </p:cNvSpPr>
-          <p:nvPr>
-            <p:ph type="title"/>
-          </p:nvPr>
-        </p:nvSpPr>
-        <p:spPr>
-          <a:xfrm>
-            <a:off x="5128601" y="3712984"/>
-            <a:ext cx="5851071" cy="1044073"/>
-          </a:xfrm>
-          <a:prstGeom prst="rect">
-            <a:avLst/>
-          </a:prstGeom>
-        </p:spPr>
-        <p:txBody>
-          <a:bodyPr>
-            <a:normAutofit/>
-          </a:bodyPr>
-          <a:lstStyle>
-            <a:lvl1pPr defTabSz="502412">
-              <a:defRPr sz="6880"/>
-            </a:lvl1pPr>
-          </a:lstStyle>
-          <a:p>
-            <a:r>
-              <a:rPr lang="en-US" sz="6000" dirty="0"/>
-              <a:t>Implementation</a:t>
-            </a:r>
-            <a:endParaRPr sz="6000" dirty="0"/>
-          </a:p>
-        </p:txBody>
-      </p:sp>
-      <p:sp>
-        <p:nvSpPr>
-          <p:cNvPr id="2" name="TextBox 1">
+      <p:pic>
+        <p:nvPicPr>
+          <p:cNvPr id="8" name="Picture 7" descr="Domin_Model - Visual Paradigm Community Edition[Roy] (not for commercial use)">
             <a:extLst>
               <a:ext uri="{FF2B5EF4-FFF2-40B4-BE49-F238E27FC236}">
-                <a16:creationId xmlns:a16="http://schemas.microsoft.com/office/drawing/2014/main" id="{AF146942-3CE3-4127-9BC3-0E813EB5EC8B}"/>
-              </a:ext>
-            </a:extLst>
-          </p:cNvPr>
-          <p:cNvSpPr txBox="1"/>
-          <p:nvPr/>
-        </p:nvSpPr>
-        <p:spPr>
-          <a:xfrm>
-            <a:off x="5503162" y="4963888"/>
-            <a:ext cx="5101948" cy="369332"/>
-          </a:xfrm>
-          <a:prstGeom prst="rect">
-            <a:avLst/>
-          </a:prstGeom>
-          <a:noFill/>
-        </p:spPr>
-        <p:txBody>
-          <a:bodyPr wrap="square" rtlCol="0">
-            <a:spAutoFit/>
-          </a:bodyPr>
-          <a:lstStyle/>
-          <a:p>
-            <a:r>
-              <a:rPr lang="en-US" dirty="0"/>
-              <a:t>GUI – Controller – Panel Manager -  Database</a:t>
-            </a:r>
-          </a:p>
-        </p:txBody>
-      </p:sp>
-      <p:pic>
-        <p:nvPicPr>
-          <p:cNvPr id="4" name="Picture 3">
-            <a:extLst>
-              <a:ext uri="{FF2B5EF4-FFF2-40B4-BE49-F238E27FC236}">
-                <a16:creationId xmlns:a16="http://schemas.microsoft.com/office/drawing/2014/main" id="{4EB11DEB-30A1-495D-B87D-D024A76E6FD7}"/>
+                <a16:creationId xmlns:a16="http://schemas.microsoft.com/office/drawing/2014/main" id="{5F17E2BC-E1A5-4264-961B-D76E15DE25DB}"/>
               </a:ext>
             </a:extLst>
           </p:cNvPr>
@@ -8550,43 +10590,17 @@
         </p:blipFill>
         <p:spPr>
           <a:xfrm>
-            <a:off x="504251" y="348343"/>
-            <a:ext cx="4619857" cy="9056914"/>
+            <a:off x="104035" y="-163862"/>
+            <a:ext cx="12796729" cy="9917462"/>
           </a:xfrm>
           <a:prstGeom prst="rect">
             <a:avLst/>
           </a:prstGeom>
         </p:spPr>
       </p:pic>
-    </p:spTree>
-  </p:cSld>
-  <p:clrMapOvr>
-    <a:masterClrMapping/>
-  </p:clrMapOvr>
-  <p:transition spd="med"/>
-</p:sld>
-</file>
-
-<file path=ppt/slides/slide3.xml><?xml version="1.0" encoding="utf-8"?>
-<p:sld xmlns:a="http://schemas.openxmlformats.org/drawingml/2006/main" xmlns:r="http://schemas.openxmlformats.org/officeDocument/2006/relationships" xmlns:p="http://schemas.openxmlformats.org/presentationml/2006/main">
-  <p:cSld>
-    <p:spTree>
-      <p:nvGrpSpPr>
-        <p:cNvPr id="1" name=""/>
-        <p:cNvGrpSpPr/>
-        <p:nvPr/>
-      </p:nvGrpSpPr>
-      <p:grpSpPr>
-        <a:xfrm>
-          <a:off x="0" y="0"/>
-          <a:ext cx="0" cy="0"/>
-          <a:chOff x="0" y="0"/>
-          <a:chExt cx="0" cy="0"/>
-        </a:xfrm>
-      </p:grpSpPr>
-      <p:sp>
-        <p:nvSpPr>
-          <p:cNvPr id="135" name="Domain Models"/>
+      <p:sp>
+        <p:nvSpPr>
+          <p:cNvPr id="141" name="Use Case Diagram"/>
           <p:cNvSpPr txBox="1">
             <a:spLocks noGrp="1"/>
           </p:cNvSpPr>
@@ -8596,608 +10610,33 @@
         </p:nvSpPr>
         <p:spPr>
           <a:xfrm>
-            <a:off x="549727" y="519604"/>
-            <a:ext cx="2922816" cy="949967"/>
+            <a:off x="2638539" y="7673135"/>
+            <a:ext cx="8840570" cy="1557417"/>
           </a:xfrm>
           <a:prstGeom prst="rect">
             <a:avLst/>
           </a:prstGeom>
         </p:spPr>
         <p:txBody>
-          <a:bodyPr>
-            <a:noAutofit/>
+          <a:bodyPr vert="horz" lIns="91440" tIns="45720" rIns="91440" bIns="45720" rtlCol="0" anchor="b">
+            <a:normAutofit/>
           </a:bodyPr>
           <a:lstStyle/>
           <a:p>
+            <a:pPr defTabSz="457200"/>
             <a:r>
               <a:rPr lang="en-US" sz="6000" dirty="0"/>
-              <a:t>Testing</a:t>
-            </a:r>
-            <a:endParaRPr sz="6000" dirty="0"/>
-          </a:p>
-        </p:txBody>
-      </p:sp>
-      <p:pic>
-        <p:nvPicPr>
-          <p:cNvPr id="4" name="Picture 3">
-            <a:extLst>
-              <a:ext uri="{FF2B5EF4-FFF2-40B4-BE49-F238E27FC236}">
-                <a16:creationId xmlns:a16="http://schemas.microsoft.com/office/drawing/2014/main" id="{14322646-E501-4A91-8891-0D1599D58BDC}"/>
-              </a:ext>
-            </a:extLst>
-          </p:cNvPr>
-          <p:cNvPicPr>
-            <a:picLocks noChangeAspect="1"/>
-          </p:cNvPicPr>
-          <p:nvPr/>
-        </p:nvPicPr>
-        <p:blipFill>
-          <a:blip r:embed="rId2">
-            <a:extLst>
-              <a:ext uri="{28A0092B-C50C-407E-A947-70E740481C1C}">
-                <a14:useLocalDpi xmlns:a14="http://schemas.microsoft.com/office/drawing/2010/main" val="0"/>
-              </a:ext>
-            </a:extLst>
-          </a:blip>
-          <a:stretch>
-            <a:fillRect/>
-          </a:stretch>
-        </p:blipFill>
-        <p:spPr>
-          <a:xfrm>
-            <a:off x="3917041" y="1794329"/>
-            <a:ext cx="3082471" cy="3082471"/>
-          </a:xfrm>
-          <a:prstGeom prst="rect">
-            <a:avLst/>
-          </a:prstGeom>
-        </p:spPr>
-      </p:pic>
-      <p:pic>
-        <p:nvPicPr>
-          <p:cNvPr id="6" name="Picture 5">
-            <a:extLst>
-              <a:ext uri="{FF2B5EF4-FFF2-40B4-BE49-F238E27FC236}">
-                <a16:creationId xmlns:a16="http://schemas.microsoft.com/office/drawing/2014/main" id="{DB39DB8E-8E7B-4B06-B4A0-B49712DB79C7}"/>
-              </a:ext>
-            </a:extLst>
-          </p:cNvPr>
-          <p:cNvPicPr>
-            <a:picLocks noChangeAspect="1"/>
-          </p:cNvPicPr>
-          <p:nvPr/>
-        </p:nvPicPr>
-        <p:blipFill>
-          <a:blip r:embed="rId3">
-            <a:extLst>
-              <a:ext uri="{28A0092B-C50C-407E-A947-70E740481C1C}">
-                <a14:useLocalDpi xmlns:a14="http://schemas.microsoft.com/office/drawing/2010/main" val="0"/>
-              </a:ext>
-            </a:extLst>
-          </a:blip>
-          <a:stretch>
-            <a:fillRect/>
-          </a:stretch>
-        </p:blipFill>
-        <p:spPr>
-          <a:xfrm>
-            <a:off x="1537154" y="4117976"/>
-            <a:ext cx="7143750" cy="4019550"/>
-          </a:xfrm>
-          <a:prstGeom prst="rect">
-            <a:avLst/>
-          </a:prstGeom>
-        </p:spPr>
-      </p:pic>
-    </p:spTree>
-  </p:cSld>
-  <p:clrMapOvr>
-    <a:masterClrMapping/>
-  </p:clrMapOvr>
-  <p:transition spd="med"/>
-</p:sld>
-</file>
-
-<file path=ppt/slides/slide4.xml><?xml version="1.0" encoding="utf-8"?>
-<p:sld xmlns:a="http://schemas.openxmlformats.org/drawingml/2006/main" xmlns:r="http://schemas.openxmlformats.org/officeDocument/2006/relationships" xmlns:p="http://schemas.openxmlformats.org/presentationml/2006/main">
-  <p:cSld>
-    <p:spTree>
-      <p:nvGrpSpPr>
-        <p:cNvPr id="1" name=""/>
-        <p:cNvGrpSpPr/>
-        <p:nvPr/>
-      </p:nvGrpSpPr>
-      <p:grpSpPr>
-        <a:xfrm>
-          <a:off x="0" y="0"/>
-          <a:ext cx="0" cy="0"/>
-          <a:chOff x="0" y="0"/>
-          <a:chExt cx="0" cy="0"/>
-        </a:xfrm>
-      </p:grpSpPr>
-      <p:sp>
-        <p:nvSpPr>
-          <p:cNvPr id="141" name="Use Case Diagram"/>
-          <p:cNvSpPr txBox="1">
-            <a:spLocks noGrp="1"/>
-          </p:cNvSpPr>
-          <p:nvPr>
-            <p:ph type="title"/>
-          </p:nvPr>
-        </p:nvSpPr>
-        <p:spPr>
-          <a:xfrm>
-            <a:off x="639061" y="626592"/>
-            <a:ext cx="6917871" cy="956127"/>
-          </a:xfrm>
-          <a:prstGeom prst="rect">
-            <a:avLst/>
-          </a:prstGeom>
-        </p:spPr>
-        <p:txBody>
-          <a:bodyPr>
-            <a:noAutofit/>
-          </a:bodyPr>
-          <a:lstStyle/>
-          <a:p>
-            <a:r>
-              <a:rPr lang="en-US" sz="6000" dirty="0"/>
-              <a:t>Domain Model V2.0</a:t>
-            </a:r>
-            <a:endParaRPr sz="6000" dirty="0"/>
-          </a:p>
-        </p:txBody>
-      </p:sp>
-      <p:pic>
-        <p:nvPicPr>
-          <p:cNvPr id="6" name="Picture 5">
-            <a:extLst>
-              <a:ext uri="{FF2B5EF4-FFF2-40B4-BE49-F238E27FC236}">
-                <a16:creationId xmlns:a16="http://schemas.microsoft.com/office/drawing/2014/main" id="{8A99747B-AB84-4804-88A5-FEDBC324F182}"/>
-              </a:ext>
-            </a:extLst>
-          </p:cNvPr>
-          <p:cNvPicPr>
-            <a:picLocks noChangeAspect="1"/>
-          </p:cNvPicPr>
-          <p:nvPr/>
-        </p:nvPicPr>
-        <p:blipFill>
-          <a:blip r:embed="rId2">
-            <a:extLst>
-              <a:ext uri="{28A0092B-C50C-407E-A947-70E740481C1C}">
-                <a14:useLocalDpi xmlns:a14="http://schemas.microsoft.com/office/drawing/2010/main" val="0"/>
-              </a:ext>
-            </a:extLst>
-          </a:blip>
-          <a:stretch>
-            <a:fillRect/>
-          </a:stretch>
-        </p:blipFill>
-        <p:spPr>
-          <a:xfrm>
-            <a:off x="639061" y="1738453"/>
-            <a:ext cx="9419339" cy="6910491"/>
-          </a:xfrm>
-          <a:prstGeom prst="rect">
-            <a:avLst/>
-          </a:prstGeom>
-        </p:spPr>
-      </p:pic>
+              <a:t>Domain Model Diagram</a:t>
+            </a:r>
+          </a:p>
+        </p:txBody>
+      </p:sp>
     </p:spTree>
     <p:extLst>
       <p:ext uri="{BB962C8B-B14F-4D97-AF65-F5344CB8AC3E}">
         <p14:creationId xmlns:p14="http://schemas.microsoft.com/office/powerpoint/2010/main" val="3718677474"/>
       </p:ext>
     </p:extLst>
-  </p:cSld>
-  <p:clrMapOvr>
-    <a:masterClrMapping/>
-  </p:clrMapOvr>
-  <p:transition spd="med"/>
-</p:sld>
-</file>
-
-<file path=ppt/slides/slide5.xml><?xml version="1.0" encoding="utf-8"?>
-<p:sld xmlns:a="http://schemas.openxmlformats.org/drawingml/2006/main" xmlns:r="http://schemas.openxmlformats.org/officeDocument/2006/relationships" xmlns:p="http://schemas.openxmlformats.org/presentationml/2006/main">
-  <p:cSld>
-    <p:spTree>
-      <p:nvGrpSpPr>
-        <p:cNvPr id="1" name=""/>
-        <p:cNvGrpSpPr/>
-        <p:nvPr/>
-      </p:nvGrpSpPr>
-      <p:grpSpPr>
-        <a:xfrm>
-          <a:off x="0" y="0"/>
-          <a:ext cx="0" cy="0"/>
-          <a:chOff x="0" y="0"/>
-          <a:chExt cx="0" cy="0"/>
-        </a:xfrm>
-      </p:grpSpPr>
-      <p:sp>
-        <p:nvSpPr>
-          <p:cNvPr id="2" name="Title 1">
-            <a:extLst>
-              <a:ext uri="{FF2B5EF4-FFF2-40B4-BE49-F238E27FC236}">
-                <a16:creationId xmlns:a16="http://schemas.microsoft.com/office/drawing/2014/main" id="{3B3389FB-D43F-4CBA-A12D-15030DCB330A}"/>
-              </a:ext>
-            </a:extLst>
-          </p:cNvPr>
-          <p:cNvSpPr>
-            <a:spLocks noGrp="1"/>
-          </p:cNvSpPr>
-          <p:nvPr>
-            <p:ph type="title"/>
-          </p:nvPr>
-        </p:nvSpPr>
-        <p:spPr/>
-        <p:txBody>
-          <a:bodyPr/>
-          <a:lstStyle/>
-          <a:p>
-            <a:r>
-              <a:rPr lang="en-US" dirty="0"/>
-              <a:t>Class Diagram V2.0</a:t>
-            </a:r>
-          </a:p>
-        </p:txBody>
-      </p:sp>
-    </p:spTree>
-    <p:extLst>
-      <p:ext uri="{BB962C8B-B14F-4D97-AF65-F5344CB8AC3E}">
-        <p14:creationId xmlns:p14="http://schemas.microsoft.com/office/powerpoint/2010/main" val="2109142703"/>
-      </p:ext>
-    </p:extLst>
-  </p:cSld>
-  <p:clrMapOvr>
-    <a:masterClrMapping/>
-  </p:clrMapOvr>
-  <p:transition spd="med"/>
-</p:sld>
-</file>
-
-<file path=ppt/slides/slide6.xml><?xml version="1.0" encoding="utf-8"?>
-<p:sld xmlns:a="http://schemas.openxmlformats.org/drawingml/2006/main" xmlns:r="http://schemas.openxmlformats.org/officeDocument/2006/relationships" xmlns:p="http://schemas.openxmlformats.org/presentationml/2006/main">
-  <p:cSld>
-    <p:spTree>
-      <p:nvGrpSpPr>
-        <p:cNvPr id="1" name=""/>
-        <p:cNvGrpSpPr/>
-        <p:nvPr/>
-      </p:nvGrpSpPr>
-      <p:grpSpPr>
-        <a:xfrm>
-          <a:off x="0" y="0"/>
-          <a:ext cx="0" cy="0"/>
-          <a:chOff x="0" y="0"/>
-          <a:chExt cx="0" cy="0"/>
-        </a:xfrm>
-      </p:grpSpPr>
-      <p:sp>
-        <p:nvSpPr>
-          <p:cNvPr id="2" name="Title 1">
-            <a:extLst>
-              <a:ext uri="{FF2B5EF4-FFF2-40B4-BE49-F238E27FC236}">
-                <a16:creationId xmlns:a16="http://schemas.microsoft.com/office/drawing/2014/main" id="{9B3F2CBF-43B3-401F-B3E7-14EDF87C8C10}"/>
-              </a:ext>
-            </a:extLst>
-          </p:cNvPr>
-          <p:cNvSpPr>
-            <a:spLocks noGrp="1"/>
-          </p:cNvSpPr>
-          <p:nvPr>
-            <p:ph type="title"/>
-          </p:nvPr>
-        </p:nvSpPr>
-        <p:spPr>
-          <a:xfrm>
-            <a:off x="1988471" y="475907"/>
-            <a:ext cx="9027858" cy="1878471"/>
-          </a:xfrm>
-        </p:spPr>
-        <p:txBody>
-          <a:bodyPr/>
-          <a:lstStyle/>
-          <a:p>
-            <a:r>
-              <a:rPr lang="en-US" dirty="0"/>
-              <a:t>Operations V2.0</a:t>
-            </a:r>
-          </a:p>
-        </p:txBody>
-      </p:sp>
-      <p:pic>
-        <p:nvPicPr>
-          <p:cNvPr id="5" name="Picture 4">
-            <a:extLst>
-              <a:ext uri="{FF2B5EF4-FFF2-40B4-BE49-F238E27FC236}">
-                <a16:creationId xmlns:a16="http://schemas.microsoft.com/office/drawing/2014/main" id="{14495ADA-57DC-46A2-B817-53A86B20AB83}"/>
-              </a:ext>
-            </a:extLst>
-          </p:cNvPr>
-          <p:cNvPicPr>
-            <a:picLocks noChangeAspect="1"/>
-          </p:cNvPicPr>
-          <p:nvPr/>
-        </p:nvPicPr>
-        <p:blipFill>
-          <a:blip r:embed="rId2">
-            <a:extLst>
-              <a:ext uri="{28A0092B-C50C-407E-A947-70E740481C1C}">
-                <a14:useLocalDpi xmlns:a14="http://schemas.microsoft.com/office/drawing/2010/main" val="0"/>
-              </a:ext>
-            </a:extLst>
-          </a:blip>
-          <a:stretch>
-            <a:fillRect/>
-          </a:stretch>
-        </p:blipFill>
-        <p:spPr>
-          <a:xfrm>
-            <a:off x="1429212" y="1415143"/>
-            <a:ext cx="6245560" cy="7992830"/>
-          </a:xfrm>
-          <a:prstGeom prst="rect">
-            <a:avLst/>
-          </a:prstGeom>
-        </p:spPr>
-      </p:pic>
-    </p:spTree>
-    <p:extLst>
-      <p:ext uri="{BB962C8B-B14F-4D97-AF65-F5344CB8AC3E}">
-        <p14:creationId xmlns:p14="http://schemas.microsoft.com/office/powerpoint/2010/main" val="1806084740"/>
-      </p:ext>
-    </p:extLst>
-  </p:cSld>
-  <p:clrMapOvr>
-    <a:masterClrMapping/>
-  </p:clrMapOvr>
-  <p:transition spd="med"/>
-</p:sld>
-</file>
-
-<file path=ppt/slides/slide7.xml><?xml version="1.0" encoding="utf-8"?>
-<p:sld xmlns:a="http://schemas.openxmlformats.org/drawingml/2006/main" xmlns:r="http://schemas.openxmlformats.org/officeDocument/2006/relationships" xmlns:p="http://schemas.openxmlformats.org/presentationml/2006/main">
-  <p:cSld>
-    <p:spTree>
-      <p:nvGrpSpPr>
-        <p:cNvPr id="1" name=""/>
-        <p:cNvGrpSpPr/>
-        <p:nvPr/>
-      </p:nvGrpSpPr>
-      <p:grpSpPr>
-        <a:xfrm>
-          <a:off x="0" y="0"/>
-          <a:ext cx="0" cy="0"/>
-          <a:chOff x="0" y="0"/>
-          <a:chExt cx="0" cy="0"/>
-        </a:xfrm>
-      </p:grpSpPr>
-      <p:sp>
-        <p:nvSpPr>
-          <p:cNvPr id="2" name="Title 1">
-            <a:extLst>
-              <a:ext uri="{FF2B5EF4-FFF2-40B4-BE49-F238E27FC236}">
-                <a16:creationId xmlns:a16="http://schemas.microsoft.com/office/drawing/2014/main" id="{12E26EAE-F44D-4683-A3DE-2851D0042153}"/>
-              </a:ext>
-            </a:extLst>
-          </p:cNvPr>
-          <p:cNvSpPr>
-            <a:spLocks noGrp="1"/>
-          </p:cNvSpPr>
-          <p:nvPr>
-            <p:ph type="title"/>
-          </p:nvPr>
-        </p:nvSpPr>
-        <p:spPr/>
-        <p:txBody>
-          <a:bodyPr>
-            <a:normAutofit fontScale="90000"/>
-          </a:bodyPr>
-          <a:lstStyle/>
-          <a:p>
-            <a:r>
-              <a:rPr lang="en-US" dirty="0"/>
-              <a:t>Use Cases, Use Case Diagrams, Requirements, and SSD</a:t>
-            </a:r>
-          </a:p>
-        </p:txBody>
-      </p:sp>
-      <p:sp>
-        <p:nvSpPr>
-          <p:cNvPr id="3" name="Text Placeholder 2">
-            <a:extLst>
-              <a:ext uri="{FF2B5EF4-FFF2-40B4-BE49-F238E27FC236}">
-                <a16:creationId xmlns:a16="http://schemas.microsoft.com/office/drawing/2014/main" id="{5D130217-16C9-4973-82E2-E387CADC033C}"/>
-              </a:ext>
-            </a:extLst>
-          </p:cNvPr>
-          <p:cNvSpPr>
-            <a:spLocks noGrp="1"/>
-          </p:cNvSpPr>
-          <p:nvPr>
-            <p:ph type="body" idx="1"/>
-          </p:nvPr>
-        </p:nvSpPr>
-        <p:spPr/>
-        <p:txBody>
-          <a:bodyPr/>
-          <a:lstStyle/>
-          <a:p>
-            <a:r>
-              <a:rPr lang="en-US" dirty="0"/>
-              <a:t>Nothing really changed…</a:t>
-            </a:r>
-          </a:p>
-        </p:txBody>
-      </p:sp>
-    </p:spTree>
-    <p:extLst>
-      <p:ext uri="{BB962C8B-B14F-4D97-AF65-F5344CB8AC3E}">
-        <p14:creationId xmlns:p14="http://schemas.microsoft.com/office/powerpoint/2010/main" val="3468186578"/>
-      </p:ext>
-    </p:extLst>
-  </p:cSld>
-  <p:clrMapOvr>
-    <a:masterClrMapping/>
-  </p:clrMapOvr>
-  <p:transition spd="med"/>
-</p:sld>
-</file>
-
-<file path=ppt/slides/slide8.xml><?xml version="1.0" encoding="utf-8"?>
-<p:sld xmlns:a="http://schemas.openxmlformats.org/drawingml/2006/main" xmlns:r="http://schemas.openxmlformats.org/officeDocument/2006/relationships" xmlns:p="http://schemas.openxmlformats.org/presentationml/2006/main">
-  <p:cSld>
-    <p:spTree>
-      <p:nvGrpSpPr>
-        <p:cNvPr id="1" name=""/>
-        <p:cNvGrpSpPr/>
-        <p:nvPr/>
-      </p:nvGrpSpPr>
-      <p:grpSpPr>
-        <a:xfrm>
-          <a:off x="0" y="0"/>
-          <a:ext cx="0" cy="0"/>
-          <a:chOff x="0" y="0"/>
-          <a:chExt cx="0" cy="0"/>
-        </a:xfrm>
-      </p:grpSpPr>
-      <p:sp>
-        <p:nvSpPr>
-          <p:cNvPr id="2" name="Title 1">
-            <a:extLst>
-              <a:ext uri="{FF2B5EF4-FFF2-40B4-BE49-F238E27FC236}">
-                <a16:creationId xmlns:a16="http://schemas.microsoft.com/office/drawing/2014/main" id="{56057312-82E2-4C89-A907-6364B1C38460}"/>
-              </a:ext>
-            </a:extLst>
-          </p:cNvPr>
-          <p:cNvSpPr>
-            <a:spLocks noGrp="1"/>
-          </p:cNvSpPr>
-          <p:nvPr>
-            <p:ph type="title"/>
-          </p:nvPr>
-        </p:nvSpPr>
-        <p:spPr>
-          <a:xfrm>
-            <a:off x="3392986" y="4056501"/>
-            <a:ext cx="9027858" cy="1878471"/>
-          </a:xfrm>
-        </p:spPr>
-        <p:txBody>
-          <a:bodyPr/>
-          <a:lstStyle/>
-          <a:p>
-            <a:r>
-              <a:rPr lang="en-US" dirty="0" err="1"/>
-              <a:t>BearRides</a:t>
-            </a:r>
-            <a:endParaRPr lang="en-US" dirty="0"/>
-          </a:p>
-        </p:txBody>
-      </p:sp>
-    </p:spTree>
-    <p:extLst>
-      <p:ext uri="{BB962C8B-B14F-4D97-AF65-F5344CB8AC3E}">
-        <p14:creationId xmlns:p14="http://schemas.microsoft.com/office/powerpoint/2010/main" val="956794991"/>
-      </p:ext>
-    </p:extLst>
-  </p:cSld>
-  <p:clrMapOvr>
-    <a:masterClrMapping/>
-  </p:clrMapOvr>
-  <p:transition spd="med"/>
-</p:sld>
-</file>
-
-<file path=ppt/slides/slide9.xml><?xml version="1.0" encoding="utf-8"?>
-<p:sld xmlns:a="http://schemas.openxmlformats.org/drawingml/2006/main" xmlns:r="http://schemas.openxmlformats.org/officeDocument/2006/relationships" xmlns:p="http://schemas.openxmlformats.org/presentationml/2006/main" show="0">
-  <p:cSld>
-    <p:spTree>
-      <p:nvGrpSpPr>
-        <p:cNvPr id="1" name=""/>
-        <p:cNvGrpSpPr/>
-        <p:nvPr/>
-      </p:nvGrpSpPr>
-      <p:grpSpPr>
-        <a:xfrm>
-          <a:off x="0" y="0"/>
-          <a:ext cx="0" cy="0"/>
-          <a:chOff x="0" y="0"/>
-          <a:chExt cx="0" cy="0"/>
-        </a:xfrm>
-      </p:grpSpPr>
-      <p:sp>
-        <p:nvSpPr>
-          <p:cNvPr id="148" name="Title"/>
-          <p:cNvSpPr txBox="1">
-            <a:spLocks noGrp="1"/>
-          </p:cNvSpPr>
-          <p:nvPr>
-            <p:ph type="title"/>
-          </p:nvPr>
-        </p:nvSpPr>
-        <p:spPr>
-          <a:xfrm>
-            <a:off x="769149" y="605731"/>
-            <a:ext cx="9027858" cy="940042"/>
-          </a:xfrm>
-          <a:prstGeom prst="rect">
-            <a:avLst/>
-          </a:prstGeom>
-        </p:spPr>
-        <p:txBody>
-          <a:bodyPr>
-            <a:normAutofit/>
-          </a:bodyPr>
-          <a:lstStyle/>
-          <a:p>
-            <a:r>
-              <a:rPr lang="en-US" sz="4600" dirty="0"/>
-              <a:t>Login Page Demo</a:t>
-            </a:r>
-            <a:endParaRPr sz="4600" dirty="0"/>
-          </a:p>
-        </p:txBody>
-      </p:sp>
-      <p:pic>
-        <p:nvPicPr>
-          <p:cNvPr id="5" name="Picture 4" descr="Design Preview [LoginGUI]">
-            <a:extLst>
-              <a:ext uri="{FF2B5EF4-FFF2-40B4-BE49-F238E27FC236}">
-                <a16:creationId xmlns:a16="http://schemas.microsoft.com/office/drawing/2014/main" id="{DD4A4253-BA2B-4690-B9F0-6F26907ECA85}"/>
-              </a:ext>
-            </a:extLst>
-          </p:cNvPr>
-          <p:cNvPicPr>
-            <a:picLocks noChangeAspect="1"/>
-          </p:cNvPicPr>
-          <p:nvPr/>
-        </p:nvPicPr>
-        <p:blipFill>
-          <a:blip r:embed="rId2">
-            <a:extLst>
-              <a:ext uri="{28A0092B-C50C-407E-A947-70E740481C1C}">
-                <a14:useLocalDpi xmlns:a14="http://schemas.microsoft.com/office/drawing/2010/main" val="0"/>
-              </a:ext>
-            </a:extLst>
-          </a:blip>
-          <a:stretch>
-            <a:fillRect/>
-          </a:stretch>
-        </p:blipFill>
-        <p:spPr>
-          <a:xfrm>
-            <a:off x="769149" y="1545773"/>
-            <a:ext cx="9234957" cy="6952014"/>
-          </a:xfrm>
-          <a:prstGeom prst="rect">
-            <a:avLst/>
-          </a:prstGeom>
-        </p:spPr>
-      </p:pic>
-    </p:spTree>
   </p:cSld>
   <p:clrMapOvr>
     <a:masterClrMapping/>

</xml_diff>